<commit_message>
Added random forest cut
</commit_message>
<xml_diff>
--- a/GBC_ML1_project_pres.pptx
+++ b/GBC_ML1_project_pres.pptx
@@ -9,6 +9,8 @@
     <p:sldId id="257" r:id="rId3"/>
     <p:sldId id="259" r:id="rId4"/>
     <p:sldId id="258" r:id="rId5"/>
+    <p:sldId id="260" r:id="rId6"/>
+    <p:sldId id="261" r:id="rId7"/>
   </p:sldIdLst>
   <p:sldSz cx="12192000" cy="6858000"/>
   <p:notesSz cx="6858000" cy="9144000"/>
@@ -107,6 +109,11 @@
       </a:defRPr>
     </a:lvl9pPr>
   </p:defaultTextStyle>
+  <p:extLst>
+    <p:ext uri="{EFAFB233-063F-42B5-8137-9DF3F51BA10A}">
+      <p15:sldGuideLst xmlns:p15="http://schemas.microsoft.com/office/powerpoint/2012/main"/>
+    </p:ext>
+  </p:extLst>
 </p:presentation>
 </file>
 
@@ -259,7 +266,7 @@
           <a:p>
             <a:fld id="{290D0612-FE56-2F43-BA02-21BC6FAF1597}" type="datetimeFigureOut">
               <a:rPr lang="en-US" smtClean="0"/>
-              <a:t>10/22/22</a:t>
+              <a:t>10/22/2022</a:t>
             </a:fld>
             <a:endParaRPr lang="en-US"/>
           </a:p>
@@ -459,7 +466,7 @@
           <a:p>
             <a:fld id="{290D0612-FE56-2F43-BA02-21BC6FAF1597}" type="datetimeFigureOut">
               <a:rPr lang="en-US" smtClean="0"/>
-              <a:t>10/22/22</a:t>
+              <a:t>10/22/2022</a:t>
             </a:fld>
             <a:endParaRPr lang="en-US"/>
           </a:p>
@@ -669,7 +676,7 @@
           <a:p>
             <a:fld id="{290D0612-FE56-2F43-BA02-21BC6FAF1597}" type="datetimeFigureOut">
               <a:rPr lang="en-US" smtClean="0"/>
-              <a:t>10/22/22</a:t>
+              <a:t>10/22/2022</a:t>
             </a:fld>
             <a:endParaRPr lang="en-US"/>
           </a:p>
@@ -869,7 +876,7 @@
           <a:p>
             <a:fld id="{290D0612-FE56-2F43-BA02-21BC6FAF1597}" type="datetimeFigureOut">
               <a:rPr lang="en-US" smtClean="0"/>
-              <a:t>10/22/22</a:t>
+              <a:t>10/22/2022</a:t>
             </a:fld>
             <a:endParaRPr lang="en-US"/>
           </a:p>
@@ -1145,7 +1152,7 @@
           <a:p>
             <a:fld id="{290D0612-FE56-2F43-BA02-21BC6FAF1597}" type="datetimeFigureOut">
               <a:rPr lang="en-US" smtClean="0"/>
-              <a:t>10/22/22</a:t>
+              <a:t>10/22/2022</a:t>
             </a:fld>
             <a:endParaRPr lang="en-US"/>
           </a:p>
@@ -1413,7 +1420,7 @@
           <a:p>
             <a:fld id="{290D0612-FE56-2F43-BA02-21BC6FAF1597}" type="datetimeFigureOut">
               <a:rPr lang="en-US" smtClean="0"/>
-              <a:t>10/22/22</a:t>
+              <a:t>10/22/2022</a:t>
             </a:fld>
             <a:endParaRPr lang="en-US"/>
           </a:p>
@@ -1828,7 +1835,7 @@
           <a:p>
             <a:fld id="{290D0612-FE56-2F43-BA02-21BC6FAF1597}" type="datetimeFigureOut">
               <a:rPr lang="en-US" smtClean="0"/>
-              <a:t>10/22/22</a:t>
+              <a:t>10/22/2022</a:t>
             </a:fld>
             <a:endParaRPr lang="en-US"/>
           </a:p>
@@ -1970,7 +1977,7 @@
           <a:p>
             <a:fld id="{290D0612-FE56-2F43-BA02-21BC6FAF1597}" type="datetimeFigureOut">
               <a:rPr lang="en-US" smtClean="0"/>
-              <a:t>10/22/22</a:t>
+              <a:t>10/22/2022</a:t>
             </a:fld>
             <a:endParaRPr lang="en-US"/>
           </a:p>
@@ -2083,7 +2090,7 @@
           <a:p>
             <a:fld id="{290D0612-FE56-2F43-BA02-21BC6FAF1597}" type="datetimeFigureOut">
               <a:rPr lang="en-US" smtClean="0"/>
-              <a:t>10/22/22</a:t>
+              <a:t>10/22/2022</a:t>
             </a:fld>
             <a:endParaRPr lang="en-US"/>
           </a:p>
@@ -2396,7 +2403,7 @@
           <a:p>
             <a:fld id="{290D0612-FE56-2F43-BA02-21BC6FAF1597}" type="datetimeFigureOut">
               <a:rPr lang="en-US" smtClean="0"/>
-              <a:t>10/22/22</a:t>
+              <a:t>10/22/2022</a:t>
             </a:fld>
             <a:endParaRPr lang="en-US"/>
           </a:p>
@@ -2685,7 +2692,7 @@
           <a:p>
             <a:fld id="{290D0612-FE56-2F43-BA02-21BC6FAF1597}" type="datetimeFigureOut">
               <a:rPr lang="en-US" smtClean="0"/>
-              <a:t>10/22/22</a:t>
+              <a:t>10/22/2022</a:t>
             </a:fld>
             <a:endParaRPr lang="en-US"/>
           </a:p>
@@ -2928,7 +2935,7 @@
           <a:p>
             <a:fld id="{290D0612-FE56-2F43-BA02-21BC6FAF1597}" type="datetimeFigureOut">
               <a:rPr lang="en-US" smtClean="0"/>
-              <a:t>10/22/22</a:t>
+              <a:t>10/22/2022</a:t>
             </a:fld>
             <a:endParaRPr lang="en-US"/>
           </a:p>
@@ -3729,6 +3736,216 @@
 </p:sld>
 </file>
 
+<file path=ppt/slides/slide5.xml><?xml version="1.0" encoding="utf-8"?>
+<p:sld xmlns:a="http://schemas.openxmlformats.org/drawingml/2006/main" xmlns:r="http://schemas.openxmlformats.org/officeDocument/2006/relationships" xmlns:p="http://schemas.openxmlformats.org/presentationml/2006/main">
+  <p:cSld>
+    <p:spTree>
+      <p:nvGrpSpPr>
+        <p:cNvPr id="1" name=""/>
+        <p:cNvGrpSpPr/>
+        <p:nvPr/>
+      </p:nvGrpSpPr>
+      <p:grpSpPr>
+        <a:xfrm>
+          <a:off x="0" y="0"/>
+          <a:ext cx="0" cy="0"/>
+          <a:chOff x="0" y="0"/>
+          <a:chExt cx="0" cy="0"/>
+        </a:xfrm>
+      </p:grpSpPr>
+      <p:sp>
+        <p:nvSpPr>
+          <p:cNvPr id="2" name="Title 1">
+            <a:extLst>
+              <a:ext uri="{FF2B5EF4-FFF2-40B4-BE49-F238E27FC236}">
+                <a16:creationId xmlns:a16="http://schemas.microsoft.com/office/drawing/2014/main" id="{553B5DBB-32FF-3799-3AA7-E44F0FF954C3}"/>
+              </a:ext>
+            </a:extLst>
+          </p:cNvPr>
+          <p:cNvSpPr>
+            <a:spLocks noGrp="1"/>
+          </p:cNvSpPr>
+          <p:nvPr>
+            <p:ph type="title"/>
+          </p:nvPr>
+        </p:nvSpPr>
+        <p:spPr/>
+        <p:txBody>
+          <a:bodyPr/>
+          <a:lstStyle/>
+          <a:p>
+            <a:r>
+              <a:rPr lang="en-IN" dirty="0"/>
+              <a:t>Random Forest</a:t>
+            </a:r>
+          </a:p>
+        </p:txBody>
+      </p:sp>
+      <p:pic>
+        <p:nvPicPr>
+          <p:cNvPr id="5" name="Content Placeholder 4">
+            <a:extLst>
+              <a:ext uri="{FF2B5EF4-FFF2-40B4-BE49-F238E27FC236}">
+                <a16:creationId xmlns:a16="http://schemas.microsoft.com/office/drawing/2014/main" id="{C5D965E0-135C-C9F5-F9C5-2B9578BCD132}"/>
+              </a:ext>
+            </a:extLst>
+          </p:cNvPr>
+          <p:cNvPicPr>
+            <a:picLocks noGrp="1" noChangeAspect="1"/>
+          </p:cNvPicPr>
+          <p:nvPr>
+            <p:ph idx="1"/>
+          </p:nvPr>
+        </p:nvPicPr>
+        <p:blipFill>
+          <a:blip r:embed="rId2"/>
+          <a:stretch>
+            <a:fillRect/>
+          </a:stretch>
+        </p:blipFill>
+        <p:spPr>
+          <a:xfrm>
+            <a:off x="603374" y="2198914"/>
+            <a:ext cx="11046758" cy="4038599"/>
+          </a:xfrm>
+        </p:spPr>
+      </p:pic>
+    </p:spTree>
+    <p:extLst>
+      <p:ext uri="{BB962C8B-B14F-4D97-AF65-F5344CB8AC3E}">
+        <p14:creationId xmlns:p14="http://schemas.microsoft.com/office/powerpoint/2010/main" val="1913930858"/>
+      </p:ext>
+    </p:extLst>
+  </p:cSld>
+  <p:clrMapOvr>
+    <a:masterClrMapping/>
+  </p:clrMapOvr>
+</p:sld>
+</file>
+
+<file path=ppt/slides/slide6.xml><?xml version="1.0" encoding="utf-8"?>
+<p:sld xmlns:a="http://schemas.openxmlformats.org/drawingml/2006/main" xmlns:r="http://schemas.openxmlformats.org/officeDocument/2006/relationships" xmlns:p="http://schemas.openxmlformats.org/presentationml/2006/main">
+  <p:cSld>
+    <p:spTree>
+      <p:nvGrpSpPr>
+        <p:cNvPr id="1" name=""/>
+        <p:cNvGrpSpPr/>
+        <p:nvPr/>
+      </p:nvGrpSpPr>
+      <p:grpSpPr>
+        <a:xfrm>
+          <a:off x="0" y="0"/>
+          <a:ext cx="0" cy="0"/>
+          <a:chOff x="0" y="0"/>
+          <a:chExt cx="0" cy="0"/>
+        </a:xfrm>
+      </p:grpSpPr>
+      <p:sp>
+        <p:nvSpPr>
+          <p:cNvPr id="2" name="Title 1">
+            <a:extLst>
+              <a:ext uri="{FF2B5EF4-FFF2-40B4-BE49-F238E27FC236}">
+                <a16:creationId xmlns:a16="http://schemas.microsoft.com/office/drawing/2014/main" id="{D01E38CF-BD2B-22B4-3AE4-F5D602E394AF}"/>
+              </a:ext>
+            </a:extLst>
+          </p:cNvPr>
+          <p:cNvSpPr>
+            <a:spLocks noGrp="1"/>
+          </p:cNvSpPr>
+          <p:nvPr>
+            <p:ph type="title"/>
+          </p:nvPr>
+        </p:nvSpPr>
+        <p:spPr/>
+        <p:txBody>
+          <a:bodyPr/>
+          <a:lstStyle/>
+          <a:p>
+            <a:r>
+              <a:rPr lang="en-IN" dirty="0"/>
+              <a:t>Performance on Random Forest with </a:t>
+            </a:r>
+            <a:r>
+              <a:rPr lang="en-IN" dirty="0" err="1"/>
+              <a:t>Downsampling</a:t>
+            </a:r>
+            <a:endParaRPr lang="en-IN" dirty="0"/>
+          </a:p>
+        </p:txBody>
+      </p:sp>
+      <p:pic>
+        <p:nvPicPr>
+          <p:cNvPr id="6" name="Picture 5">
+            <a:extLst>
+              <a:ext uri="{FF2B5EF4-FFF2-40B4-BE49-F238E27FC236}">
+                <a16:creationId xmlns:a16="http://schemas.microsoft.com/office/drawing/2014/main" id="{CFB91C86-7054-8336-E63A-6DF4EB3FD14E}"/>
+              </a:ext>
+            </a:extLst>
+          </p:cNvPr>
+          <p:cNvPicPr>
+            <a:picLocks noChangeAspect="1"/>
+          </p:cNvPicPr>
+          <p:nvPr/>
+        </p:nvPicPr>
+        <p:blipFill>
+          <a:blip r:embed="rId2"/>
+          <a:stretch>
+            <a:fillRect/>
+          </a:stretch>
+        </p:blipFill>
+        <p:spPr>
+          <a:xfrm>
+            <a:off x="463871" y="2068285"/>
+            <a:ext cx="5109615" cy="4267200"/>
+          </a:xfrm>
+          <a:prstGeom prst="rect">
+            <a:avLst/>
+          </a:prstGeom>
+        </p:spPr>
+      </p:pic>
+      <p:pic>
+        <p:nvPicPr>
+          <p:cNvPr id="10" name="Picture 9">
+            <a:extLst>
+              <a:ext uri="{FF2B5EF4-FFF2-40B4-BE49-F238E27FC236}">
+                <a16:creationId xmlns:a16="http://schemas.microsoft.com/office/drawing/2014/main" id="{B875F9F1-2D99-25D4-EBA1-DB0FD622E2D9}"/>
+              </a:ext>
+            </a:extLst>
+          </p:cNvPr>
+          <p:cNvPicPr>
+            <a:picLocks noChangeAspect="1"/>
+          </p:cNvPicPr>
+          <p:nvPr/>
+        </p:nvPicPr>
+        <p:blipFill>
+          <a:blip r:embed="rId3"/>
+          <a:stretch>
+            <a:fillRect/>
+          </a:stretch>
+        </p:blipFill>
+        <p:spPr>
+          <a:xfrm>
+            <a:off x="6825344" y="2068285"/>
+            <a:ext cx="4814778" cy="4267199"/>
+          </a:xfrm>
+          <a:prstGeom prst="rect">
+            <a:avLst/>
+          </a:prstGeom>
+        </p:spPr>
+      </p:pic>
+    </p:spTree>
+    <p:extLst>
+      <p:ext uri="{BB962C8B-B14F-4D97-AF65-F5344CB8AC3E}">
+        <p14:creationId xmlns:p14="http://schemas.microsoft.com/office/powerpoint/2010/main" val="355217876"/>
+      </p:ext>
+    </p:extLst>
+  </p:cSld>
+  <p:clrMapOvr>
+    <a:masterClrMapping/>
+  </p:clrMapOvr>
+</p:sld>
+</file>
+
 <file path=ppt/theme/theme1.xml><?xml version="1.0" encoding="utf-8"?>
 <a:theme xmlns:a="http://schemas.openxmlformats.org/drawingml/2006/main" name="Office Theme">
   <a:themeElements>

</xml_diff>

<commit_message>
Added RF feaure importance plot
</commit_message>
<xml_diff>
--- a/GBC_ML1_project_pres.pptx
+++ b/GBC_ML1_project_pres.pptx
@@ -11,6 +11,7 @@
     <p:sldId id="258" r:id="rId5"/>
     <p:sldId id="260" r:id="rId6"/>
     <p:sldId id="261" r:id="rId7"/>
+    <p:sldId id="262" r:id="rId8"/>
   </p:sldIdLst>
   <p:sldSz cx="12192000" cy="6858000"/>
   <p:notesSz cx="6858000" cy="9144000"/>
@@ -3946,6 +3947,184 @@
 </p:sld>
 </file>
 
+<file path=ppt/slides/slide7.xml><?xml version="1.0" encoding="utf-8"?>
+<p:sld xmlns:a="http://schemas.openxmlformats.org/drawingml/2006/main" xmlns:r="http://schemas.openxmlformats.org/officeDocument/2006/relationships" xmlns:p="http://schemas.openxmlformats.org/presentationml/2006/main">
+  <p:cSld>
+    <p:bg>
+      <p:bgPr>
+        <a:solidFill>
+          <a:schemeClr val="bg1"/>
+        </a:solidFill>
+        <a:effectLst/>
+      </p:bgPr>
+    </p:bg>
+    <p:spTree>
+      <p:nvGrpSpPr>
+        <p:cNvPr id="1" name=""/>
+        <p:cNvGrpSpPr/>
+        <p:nvPr/>
+      </p:nvGrpSpPr>
+      <p:grpSpPr>
+        <a:xfrm>
+          <a:off x="0" y="0"/>
+          <a:ext cx="0" cy="0"/>
+          <a:chOff x="0" y="0"/>
+          <a:chExt cx="0" cy="0"/>
+        </a:xfrm>
+      </p:grpSpPr>
+      <p:sp>
+        <p:nvSpPr>
+          <p:cNvPr id="10" name="Down Arrow 7">
+            <a:extLst>
+              <a:ext uri="{FF2B5EF4-FFF2-40B4-BE49-F238E27FC236}">
+                <a16:creationId xmlns:a16="http://schemas.microsoft.com/office/drawing/2014/main" id="{D4771268-CB57-404A-9271-370EB28F6090}"/>
+              </a:ext>
+              <a:ext uri="{C183D7F6-B498-43B3-948B-1728B52AA6E4}">
+                <adec:decorative xmlns:adec="http://schemas.microsoft.com/office/drawing/2017/decorative" val="1"/>
+              </a:ext>
+            </a:extLst>
+          </p:cNvPr>
+          <p:cNvSpPr>
+            <a:spLocks noGrp="1" noRot="1" noChangeAspect="1" noMove="1" noResize="1" noEditPoints="1" noAdjustHandles="1" noChangeArrowheads="1" noChangeShapeType="1" noTextEdit="1"/>
+          </p:cNvSpPr>
+          <p:nvPr>
+            <p:extLst>
+              <p:ext uri="{386F3935-93C4-4BCD-93E2-E3B085C9AB24}">
+                <p16:designElem xmlns:p16="http://schemas.microsoft.com/office/powerpoint/2015/main" val="1"/>
+              </p:ext>
+            </p:extLst>
+          </p:nvPr>
+        </p:nvSpPr>
+        <p:spPr>
+          <a:xfrm rot="16200000">
+            <a:off x="800100" y="1491343"/>
+            <a:ext cx="3333749" cy="3499103"/>
+          </a:xfrm>
+          <a:prstGeom prst="downArrow">
+            <a:avLst>
+              <a:gd name="adj1" fmla="val 100000"/>
+              <a:gd name="adj2" fmla="val 15788"/>
+            </a:avLst>
+          </a:prstGeom>
+          <a:solidFill>
+            <a:srgbClr val="404040"/>
+          </a:solidFill>
+          <a:ln w="53975">
+            <a:noFill/>
+          </a:ln>
+        </p:spPr>
+        <p:style>
+          <a:lnRef idx="2">
+            <a:schemeClr val="accent1">
+              <a:shade val="50000"/>
+            </a:schemeClr>
+          </a:lnRef>
+          <a:fillRef idx="1">
+            <a:schemeClr val="accent1"/>
+          </a:fillRef>
+          <a:effectRef idx="0">
+            <a:schemeClr val="accent1"/>
+          </a:effectRef>
+          <a:fontRef idx="minor">
+            <a:schemeClr val="lt1"/>
+          </a:fontRef>
+        </p:style>
+        <p:txBody>
+          <a:bodyPr rtlCol="0" anchor="ctr"/>
+          <a:lstStyle/>
+          <a:p>
+            <a:pPr algn="ctr"/>
+            <a:endParaRPr lang="en-US"/>
+          </a:p>
+        </p:txBody>
+      </p:sp>
+      <p:sp>
+        <p:nvSpPr>
+          <p:cNvPr id="2" name="Title 1">
+            <a:extLst>
+              <a:ext uri="{FF2B5EF4-FFF2-40B4-BE49-F238E27FC236}">
+                <a16:creationId xmlns:a16="http://schemas.microsoft.com/office/drawing/2014/main" id="{A32BF89E-4BB9-ECE3-0056-AB541DE1755A}"/>
+              </a:ext>
+            </a:extLst>
+          </p:cNvPr>
+          <p:cNvSpPr>
+            <a:spLocks noGrp="1"/>
+          </p:cNvSpPr>
+          <p:nvPr>
+            <p:ph type="title"/>
+          </p:nvPr>
+        </p:nvSpPr>
+        <p:spPr>
+          <a:xfrm>
+            <a:off x="1028700" y="1967266"/>
+            <a:ext cx="2628900" cy="2547257"/>
+          </a:xfrm>
+          <a:noFill/>
+        </p:spPr>
+        <p:txBody>
+          <a:bodyPr vert="horz" lIns="91440" tIns="45720" rIns="91440" bIns="45720" rtlCol="0" anchor="ctr">
+            <a:normAutofit/>
+          </a:bodyPr>
+          <a:lstStyle/>
+          <a:p>
+            <a:pPr algn="ctr"/>
+            <a:r>
+              <a:rPr lang="en-US" sz="3100" kern="1200">
+                <a:solidFill>
+                  <a:srgbClr val="FFFFFF"/>
+                </a:solidFill>
+                <a:latin typeface="+mj-lt"/>
+                <a:ea typeface="+mj-ea"/>
+                <a:cs typeface="+mj-cs"/>
+              </a:rPr>
+              <a:t>Random Forest With Down Sampling – Feature Importance</a:t>
+            </a:r>
+          </a:p>
+        </p:txBody>
+      </p:sp>
+      <p:pic>
+        <p:nvPicPr>
+          <p:cNvPr id="5" name="Picture 4" descr="Chart, bar chart&#10;&#10;Description automatically generated">
+            <a:extLst>
+              <a:ext uri="{FF2B5EF4-FFF2-40B4-BE49-F238E27FC236}">
+                <a16:creationId xmlns:a16="http://schemas.microsoft.com/office/drawing/2014/main" id="{A7CA1606-462F-3DD5-5297-35F136F53263}"/>
+              </a:ext>
+            </a:extLst>
+          </p:cNvPr>
+          <p:cNvPicPr>
+            <a:picLocks noChangeAspect="1"/>
+          </p:cNvPicPr>
+          <p:nvPr/>
+        </p:nvPicPr>
+        <p:blipFill>
+          <a:blip r:embed="rId2"/>
+          <a:stretch>
+            <a:fillRect/>
+          </a:stretch>
+        </p:blipFill>
+        <p:spPr>
+          <a:xfrm>
+            <a:off x="4777316" y="944404"/>
+            <a:ext cx="6780700" cy="4966863"/>
+          </a:xfrm>
+          <a:prstGeom prst="rect">
+            <a:avLst/>
+          </a:prstGeom>
+        </p:spPr>
+      </p:pic>
+    </p:spTree>
+    <p:extLst>
+      <p:ext uri="{BB962C8B-B14F-4D97-AF65-F5344CB8AC3E}">
+        <p14:creationId xmlns:p14="http://schemas.microsoft.com/office/powerpoint/2010/main" val="1556257389"/>
+      </p:ext>
+    </p:extLst>
+  </p:cSld>
+  <p:clrMapOvr>
+    <a:masterClrMapping/>
+  </p:clrMapOvr>
+</p:sld>
+</file>
+
 <file path=ppt/theme/theme1.xml><?xml version="1.0" encoding="utf-8"?>
 <a:theme xmlns:a="http://schemas.openxmlformats.org/drawingml/2006/main" name="Office Theme">
   <a:themeElements>

</xml_diff>

<commit_message>
added the final ppt compiling
</commit_message>
<xml_diff>
--- a/GBC_ML1_project_pres.pptx
+++ b/GBC_ML1_project_pres.pptx
@@ -4,22 +4,30 @@
   <p:sldMasterIdLst>
     <p:sldMasterId id="2147483648" r:id="rId1"/>
   </p:sldMasterIdLst>
+  <p:notesMasterIdLst>
+    <p:notesMasterId r:id="rId22"/>
+  </p:notesMasterIdLst>
   <p:sldIdLst>
     <p:sldId id="256" r:id="rId2"/>
-    <p:sldId id="262" r:id="rId3"/>
-    <p:sldId id="263" r:id="rId4"/>
-    <p:sldId id="264" r:id="rId5"/>
-    <p:sldId id="265" r:id="rId6"/>
-    <p:sldId id="266" r:id="rId7"/>
+    <p:sldId id="263" r:id="rId3"/>
+    <p:sldId id="264" r:id="rId4"/>
+    <p:sldId id="265" r:id="rId5"/>
+    <p:sldId id="266" r:id="rId6"/>
+    <p:sldId id="262" r:id="rId7"/>
     <p:sldId id="267" r:id="rId8"/>
     <p:sldId id="268" r:id="rId9"/>
     <p:sldId id="269" r:id="rId10"/>
-    <p:sldId id="270" r:id="rId11"/>
-    <p:sldId id="257" r:id="rId12"/>
-    <p:sldId id="259" r:id="rId13"/>
-    <p:sldId id="258" r:id="rId14"/>
-    <p:sldId id="260" r:id="rId15"/>
-    <p:sldId id="261" r:id="rId16"/>
+    <p:sldId id="259" r:id="rId11"/>
+    <p:sldId id="270" r:id="rId12"/>
+    <p:sldId id="271" r:id="rId13"/>
+    <p:sldId id="272" r:id="rId14"/>
+    <p:sldId id="273" r:id="rId15"/>
+    <p:sldId id="274" r:id="rId16"/>
+    <p:sldId id="260" r:id="rId17"/>
+    <p:sldId id="275" r:id="rId18"/>
+    <p:sldId id="261" r:id="rId19"/>
+    <p:sldId id="257" r:id="rId20"/>
+    <p:sldId id="258" r:id="rId21"/>
   </p:sldIdLst>
   <p:sldSz cx="12192000" cy="6858000"/>
   <p:notesSz cx="6858000" cy="9144000"/>
@@ -4863,9 +4871,9 @@
     </dgm:pt>
   </dgm:ptLst>
   <dgm:cxnLst>
+    <dgm:cxn modelId="{A01FB854-8124-4C55-8567-7E2ABFDB5BAC}" type="presOf" srcId="{88AFD163-AD63-4085-947A-8243C3B312B9}" destId="{0A0B2A87-776F-4810-A158-08D81A276D49}" srcOrd="0" destOrd="0" presId="urn:microsoft.com/office/officeart/2008/layout/LinedList"/>
     <dgm:cxn modelId="{53218465-4BE9-465E-93FA-4600FA1C17B8}" srcId="{A97476D4-F1AB-431D-A231-62CF391B8F6E}" destId="{95EABCE0-47B0-4748-9170-1415BE77E26F}" srcOrd="3" destOrd="0" parTransId="{299F5C65-B85B-425E-B227-B699185DD612}" sibTransId="{4B2FA6B6-2AE3-4300-A813-2F312F3EDC85}"/>
     <dgm:cxn modelId="{B741F16A-E638-4097-A895-4E18AEFF145D}" type="presOf" srcId="{A97476D4-F1AB-431D-A231-62CF391B8F6E}" destId="{51B984B2-0114-4C78-B130-906A2FD2E219}" srcOrd="0" destOrd="0" presId="urn:microsoft.com/office/officeart/2008/layout/LinedList"/>
-    <dgm:cxn modelId="{A01FB854-8124-4C55-8567-7E2ABFDB5BAC}" type="presOf" srcId="{88AFD163-AD63-4085-947A-8243C3B312B9}" destId="{0A0B2A87-776F-4810-A158-08D81A276D49}" srcOrd="0" destOrd="0" presId="urn:microsoft.com/office/officeart/2008/layout/LinedList"/>
     <dgm:cxn modelId="{1D70A499-259E-4F72-8226-BA23EC957DF6}" srcId="{A97476D4-F1AB-431D-A231-62CF391B8F6E}" destId="{88AFD163-AD63-4085-947A-8243C3B312B9}" srcOrd="2" destOrd="0" parTransId="{1100243B-AE2F-4E8B-A209-9444B9989154}" sibTransId="{5D82F65C-237E-4FDA-9470-CE85E75E9530}"/>
     <dgm:cxn modelId="{3EB5BB9C-8945-4704-A524-C59726B816F8}" srcId="{A97476D4-F1AB-431D-A231-62CF391B8F6E}" destId="{3B1597BF-F52B-4072-B884-8075737C6B2D}" srcOrd="1" destOrd="0" parTransId="{DE8BA342-BF40-4F1B-A171-35AC45671D43}" sibTransId="{ABA3499B-3299-4C0E-8FA9-34E1D56566F8}"/>
     <dgm:cxn modelId="{76E3D2A4-C80C-4789-BA52-AB45CEAD3D7A}" srcId="{A97476D4-F1AB-431D-A231-62CF391B8F6E}" destId="{FFC48DFF-CE5F-4D73-8C20-A37560DBAEC0}" srcOrd="0" destOrd="0" parTransId="{57C69130-6F3C-4C8B-AC04-FF0453792D1B}" sibTransId="{090CFBD7-2A1B-4CDC-A8A0-511FF0597C64}"/>
@@ -15009,6 +15017,881 @@
 </dgm:styleDef>
 </file>
 
+<file path=ppt/notesMasters/notesMaster1.xml><?xml version="1.0" encoding="utf-8"?>
+<p:notesMaster xmlns:a="http://schemas.openxmlformats.org/drawingml/2006/main" xmlns:r="http://schemas.openxmlformats.org/officeDocument/2006/relationships" xmlns:p="http://schemas.openxmlformats.org/presentationml/2006/main">
+  <p:cSld>
+    <p:bg>
+      <p:bgRef idx="1001">
+        <a:schemeClr val="bg1"/>
+      </p:bgRef>
+    </p:bg>
+    <p:spTree>
+      <p:nvGrpSpPr>
+        <p:cNvPr id="1" name=""/>
+        <p:cNvGrpSpPr/>
+        <p:nvPr/>
+      </p:nvGrpSpPr>
+      <p:grpSpPr>
+        <a:xfrm>
+          <a:off x="0" y="0"/>
+          <a:ext cx="0" cy="0"/>
+          <a:chOff x="0" y="0"/>
+          <a:chExt cx="0" cy="0"/>
+        </a:xfrm>
+      </p:grpSpPr>
+      <p:sp>
+        <p:nvSpPr>
+          <p:cNvPr id="2" name="Header Placeholder 1"/>
+          <p:cNvSpPr>
+            <a:spLocks noGrp="1"/>
+          </p:cNvSpPr>
+          <p:nvPr>
+            <p:ph type="hdr" sz="quarter"/>
+          </p:nvPr>
+        </p:nvSpPr>
+        <p:spPr>
+          <a:xfrm>
+            <a:off x="0" y="0"/>
+            <a:ext cx="2971800" cy="458788"/>
+          </a:xfrm>
+          <a:prstGeom prst="rect">
+            <a:avLst/>
+          </a:prstGeom>
+        </p:spPr>
+        <p:txBody>
+          <a:bodyPr vert="horz" lIns="91440" tIns="45720" rIns="91440" bIns="45720" rtlCol="0"/>
+          <a:lstStyle>
+            <a:lvl1pPr algn="l">
+              <a:defRPr sz="1200"/>
+            </a:lvl1pPr>
+          </a:lstStyle>
+          <a:p>
+            <a:endParaRPr lang="en-US"/>
+          </a:p>
+        </p:txBody>
+      </p:sp>
+      <p:sp>
+        <p:nvSpPr>
+          <p:cNvPr id="3" name="Date Placeholder 2"/>
+          <p:cNvSpPr>
+            <a:spLocks noGrp="1"/>
+          </p:cNvSpPr>
+          <p:nvPr>
+            <p:ph type="dt" idx="1"/>
+          </p:nvPr>
+        </p:nvSpPr>
+        <p:spPr>
+          <a:xfrm>
+            <a:off x="3884613" y="0"/>
+            <a:ext cx="2971800" cy="458788"/>
+          </a:xfrm>
+          <a:prstGeom prst="rect">
+            <a:avLst/>
+          </a:prstGeom>
+        </p:spPr>
+        <p:txBody>
+          <a:bodyPr vert="horz" lIns="91440" tIns="45720" rIns="91440" bIns="45720" rtlCol="0"/>
+          <a:lstStyle>
+            <a:lvl1pPr algn="r">
+              <a:defRPr sz="1200"/>
+            </a:lvl1pPr>
+          </a:lstStyle>
+          <a:p>
+            <a:fld id="{B4109186-C783-5840-AA38-57B9DBBED313}" type="datetimeFigureOut">
+              <a:rPr lang="en-US" smtClean="0"/>
+              <a:t>10/22/22</a:t>
+            </a:fld>
+            <a:endParaRPr lang="en-US"/>
+          </a:p>
+        </p:txBody>
+      </p:sp>
+      <p:sp>
+        <p:nvSpPr>
+          <p:cNvPr id="4" name="Slide Image Placeholder 3"/>
+          <p:cNvSpPr>
+            <a:spLocks noGrp="1" noRot="1" noChangeAspect="1"/>
+          </p:cNvSpPr>
+          <p:nvPr>
+            <p:ph type="sldImg" idx="2"/>
+          </p:nvPr>
+        </p:nvSpPr>
+        <p:spPr>
+          <a:xfrm>
+            <a:off x="685800" y="1143000"/>
+            <a:ext cx="5486400" cy="3086100"/>
+          </a:xfrm>
+          <a:prstGeom prst="rect">
+            <a:avLst/>
+          </a:prstGeom>
+          <a:noFill/>
+          <a:ln w="12700">
+            <a:solidFill>
+              <a:prstClr val="black"/>
+            </a:solidFill>
+          </a:ln>
+        </p:spPr>
+        <p:txBody>
+          <a:bodyPr vert="horz" lIns="91440" tIns="45720" rIns="91440" bIns="45720" rtlCol="0" anchor="ctr"/>
+          <a:lstStyle/>
+          <a:p>
+            <a:endParaRPr lang="en-US"/>
+          </a:p>
+        </p:txBody>
+      </p:sp>
+      <p:sp>
+        <p:nvSpPr>
+          <p:cNvPr id="5" name="Notes Placeholder 4"/>
+          <p:cNvSpPr>
+            <a:spLocks noGrp="1"/>
+          </p:cNvSpPr>
+          <p:nvPr>
+            <p:ph type="body" sz="quarter" idx="3"/>
+          </p:nvPr>
+        </p:nvSpPr>
+        <p:spPr>
+          <a:xfrm>
+            <a:off x="685800" y="4400550"/>
+            <a:ext cx="5486400" cy="3600450"/>
+          </a:xfrm>
+          <a:prstGeom prst="rect">
+            <a:avLst/>
+          </a:prstGeom>
+        </p:spPr>
+        <p:txBody>
+          <a:bodyPr vert="horz" lIns="91440" tIns="45720" rIns="91440" bIns="45720" rtlCol="0"/>
+          <a:lstStyle/>
+          <a:p>
+            <a:pPr lvl="0"/>
+            <a:r>
+              <a:rPr lang="en-GB"/>
+              <a:t>Click to edit Master text styles</a:t>
+            </a:r>
+          </a:p>
+          <a:p>
+            <a:pPr lvl="1"/>
+            <a:r>
+              <a:rPr lang="en-GB"/>
+              <a:t>Second level</a:t>
+            </a:r>
+          </a:p>
+          <a:p>
+            <a:pPr lvl="2"/>
+            <a:r>
+              <a:rPr lang="en-GB"/>
+              <a:t>Third level</a:t>
+            </a:r>
+          </a:p>
+          <a:p>
+            <a:pPr lvl="3"/>
+            <a:r>
+              <a:rPr lang="en-GB"/>
+              <a:t>Fourth level</a:t>
+            </a:r>
+          </a:p>
+          <a:p>
+            <a:pPr lvl="4"/>
+            <a:r>
+              <a:rPr lang="en-GB"/>
+              <a:t>Fifth level</a:t>
+            </a:r>
+            <a:endParaRPr lang="en-US"/>
+          </a:p>
+        </p:txBody>
+      </p:sp>
+      <p:sp>
+        <p:nvSpPr>
+          <p:cNvPr id="6" name="Footer Placeholder 5"/>
+          <p:cNvSpPr>
+            <a:spLocks noGrp="1"/>
+          </p:cNvSpPr>
+          <p:nvPr>
+            <p:ph type="ftr" sz="quarter" idx="4"/>
+          </p:nvPr>
+        </p:nvSpPr>
+        <p:spPr>
+          <a:xfrm>
+            <a:off x="0" y="8685213"/>
+            <a:ext cx="2971800" cy="458787"/>
+          </a:xfrm>
+          <a:prstGeom prst="rect">
+            <a:avLst/>
+          </a:prstGeom>
+        </p:spPr>
+        <p:txBody>
+          <a:bodyPr vert="horz" lIns="91440" tIns="45720" rIns="91440" bIns="45720" rtlCol="0" anchor="b"/>
+          <a:lstStyle>
+            <a:lvl1pPr algn="l">
+              <a:defRPr sz="1200"/>
+            </a:lvl1pPr>
+          </a:lstStyle>
+          <a:p>
+            <a:endParaRPr lang="en-US"/>
+          </a:p>
+        </p:txBody>
+      </p:sp>
+      <p:sp>
+        <p:nvSpPr>
+          <p:cNvPr id="7" name="Slide Number Placeholder 6"/>
+          <p:cNvSpPr>
+            <a:spLocks noGrp="1"/>
+          </p:cNvSpPr>
+          <p:nvPr>
+            <p:ph type="sldNum" sz="quarter" idx="5"/>
+          </p:nvPr>
+        </p:nvSpPr>
+        <p:spPr>
+          <a:xfrm>
+            <a:off x="3884613" y="8685213"/>
+            <a:ext cx="2971800" cy="458787"/>
+          </a:xfrm>
+          <a:prstGeom prst="rect">
+            <a:avLst/>
+          </a:prstGeom>
+        </p:spPr>
+        <p:txBody>
+          <a:bodyPr vert="horz" lIns="91440" tIns="45720" rIns="91440" bIns="45720" rtlCol="0" anchor="b"/>
+          <a:lstStyle>
+            <a:lvl1pPr algn="r">
+              <a:defRPr sz="1200"/>
+            </a:lvl1pPr>
+          </a:lstStyle>
+          <a:p>
+            <a:fld id="{E37848DA-415C-4849-99D3-5C7873F5F9CE}" type="slidenum">
+              <a:rPr lang="en-US" smtClean="0"/>
+              <a:t>‹#›</a:t>
+            </a:fld>
+            <a:endParaRPr lang="en-US"/>
+          </a:p>
+        </p:txBody>
+      </p:sp>
+    </p:spTree>
+    <p:extLst>
+      <p:ext uri="{BB962C8B-B14F-4D97-AF65-F5344CB8AC3E}">
+        <p14:creationId xmlns:p14="http://schemas.microsoft.com/office/powerpoint/2010/main" val="2326918625"/>
+      </p:ext>
+    </p:extLst>
+  </p:cSld>
+  <p:clrMap bg1="lt1" tx1="dk1" bg2="lt2" tx2="dk2" accent1="accent1" accent2="accent2" accent3="accent3" accent4="accent4" accent5="accent5" accent6="accent6" hlink="hlink" folHlink="folHlink"/>
+  <p:notesStyle>
+    <a:lvl1pPr marL="0" algn="l" defTabSz="914400" rtl="0" eaLnBrk="1" latinLnBrk="0" hangingPunct="1">
+      <a:defRPr sz="1200" kern="1200">
+        <a:solidFill>
+          <a:schemeClr val="tx1"/>
+        </a:solidFill>
+        <a:latin typeface="+mn-lt"/>
+        <a:ea typeface="+mn-ea"/>
+        <a:cs typeface="+mn-cs"/>
+      </a:defRPr>
+    </a:lvl1pPr>
+    <a:lvl2pPr marL="457200" algn="l" defTabSz="914400" rtl="0" eaLnBrk="1" latinLnBrk="0" hangingPunct="1">
+      <a:defRPr sz="1200" kern="1200">
+        <a:solidFill>
+          <a:schemeClr val="tx1"/>
+        </a:solidFill>
+        <a:latin typeface="+mn-lt"/>
+        <a:ea typeface="+mn-ea"/>
+        <a:cs typeface="+mn-cs"/>
+      </a:defRPr>
+    </a:lvl2pPr>
+    <a:lvl3pPr marL="914400" algn="l" defTabSz="914400" rtl="0" eaLnBrk="1" latinLnBrk="0" hangingPunct="1">
+      <a:defRPr sz="1200" kern="1200">
+        <a:solidFill>
+          <a:schemeClr val="tx1"/>
+        </a:solidFill>
+        <a:latin typeface="+mn-lt"/>
+        <a:ea typeface="+mn-ea"/>
+        <a:cs typeface="+mn-cs"/>
+      </a:defRPr>
+    </a:lvl3pPr>
+    <a:lvl4pPr marL="1371600" algn="l" defTabSz="914400" rtl="0" eaLnBrk="1" latinLnBrk="0" hangingPunct="1">
+      <a:defRPr sz="1200" kern="1200">
+        <a:solidFill>
+          <a:schemeClr val="tx1"/>
+        </a:solidFill>
+        <a:latin typeface="+mn-lt"/>
+        <a:ea typeface="+mn-ea"/>
+        <a:cs typeface="+mn-cs"/>
+      </a:defRPr>
+    </a:lvl4pPr>
+    <a:lvl5pPr marL="1828800" algn="l" defTabSz="914400" rtl="0" eaLnBrk="1" latinLnBrk="0" hangingPunct="1">
+      <a:defRPr sz="1200" kern="1200">
+        <a:solidFill>
+          <a:schemeClr val="tx1"/>
+        </a:solidFill>
+        <a:latin typeface="+mn-lt"/>
+        <a:ea typeface="+mn-ea"/>
+        <a:cs typeface="+mn-cs"/>
+      </a:defRPr>
+    </a:lvl5pPr>
+    <a:lvl6pPr marL="2286000" algn="l" defTabSz="914400" rtl="0" eaLnBrk="1" latinLnBrk="0" hangingPunct="1">
+      <a:defRPr sz="1200" kern="1200">
+        <a:solidFill>
+          <a:schemeClr val="tx1"/>
+        </a:solidFill>
+        <a:latin typeface="+mn-lt"/>
+        <a:ea typeface="+mn-ea"/>
+        <a:cs typeface="+mn-cs"/>
+      </a:defRPr>
+    </a:lvl6pPr>
+    <a:lvl7pPr marL="2743200" algn="l" defTabSz="914400" rtl="0" eaLnBrk="1" latinLnBrk="0" hangingPunct="1">
+      <a:defRPr sz="1200" kern="1200">
+        <a:solidFill>
+          <a:schemeClr val="tx1"/>
+        </a:solidFill>
+        <a:latin typeface="+mn-lt"/>
+        <a:ea typeface="+mn-ea"/>
+        <a:cs typeface="+mn-cs"/>
+      </a:defRPr>
+    </a:lvl7pPr>
+    <a:lvl8pPr marL="3200400" algn="l" defTabSz="914400" rtl="0" eaLnBrk="1" latinLnBrk="0" hangingPunct="1">
+      <a:defRPr sz="1200" kern="1200">
+        <a:solidFill>
+          <a:schemeClr val="tx1"/>
+        </a:solidFill>
+        <a:latin typeface="+mn-lt"/>
+        <a:ea typeface="+mn-ea"/>
+        <a:cs typeface="+mn-cs"/>
+      </a:defRPr>
+    </a:lvl8pPr>
+    <a:lvl9pPr marL="3657600" algn="l" defTabSz="914400" rtl="0" eaLnBrk="1" latinLnBrk="0" hangingPunct="1">
+      <a:defRPr sz="1200" kern="1200">
+        <a:solidFill>
+          <a:schemeClr val="tx1"/>
+        </a:solidFill>
+        <a:latin typeface="+mn-lt"/>
+        <a:ea typeface="+mn-ea"/>
+        <a:cs typeface="+mn-cs"/>
+      </a:defRPr>
+    </a:lvl9pPr>
+  </p:notesStyle>
+</p:notesMaster>
+</file>
+
+<file path=ppt/notesSlides/notesSlide1.xml><?xml version="1.0" encoding="utf-8"?>
+<p:notes xmlns:a="http://schemas.openxmlformats.org/drawingml/2006/main" xmlns:r="http://schemas.openxmlformats.org/officeDocument/2006/relationships" xmlns:p="http://schemas.openxmlformats.org/presentationml/2006/main" showMasterSp="0" showMasterPhAnim="0">
+  <p:cSld>
+    <p:spTree>
+      <p:nvGrpSpPr>
+        <p:cNvPr id="1" name="Shape 50"/>
+        <p:cNvGrpSpPr/>
+        <p:nvPr/>
+      </p:nvGrpSpPr>
+      <p:grpSpPr>
+        <a:xfrm>
+          <a:off x="0" y="0"/>
+          <a:ext cx="0" cy="0"/>
+          <a:chOff x="0" y="0"/>
+          <a:chExt cx="0" cy="0"/>
+        </a:xfrm>
+      </p:grpSpPr>
+      <p:sp>
+        <p:nvSpPr>
+          <p:cNvPr id="51" name="Google Shape;51;p:notes"/>
+          <p:cNvSpPr>
+            <a:spLocks noGrp="1" noRot="1" noChangeAspect="1"/>
+          </p:cNvSpPr>
+          <p:nvPr>
+            <p:ph type="sldImg" idx="2"/>
+          </p:nvPr>
+        </p:nvSpPr>
+        <p:spPr>
+          <a:xfrm>
+            <a:off x="381300" y="685800"/>
+            <a:ext cx="6096075" cy="3429000"/>
+          </a:xfrm>
+          <a:custGeom>
+            <a:avLst/>
+            <a:gdLst/>
+            <a:ahLst/>
+            <a:cxnLst/>
+            <a:rect l="l" t="t" r="r" b="b"/>
+            <a:pathLst>
+              <a:path w="120000" h="120000" extrusionOk="0">
+                <a:moveTo>
+                  <a:pt x="0" y="0"/>
+                </a:moveTo>
+                <a:lnTo>
+                  <a:pt x="120000" y="0"/>
+                </a:lnTo>
+                <a:lnTo>
+                  <a:pt x="120000" y="120000"/>
+                </a:lnTo>
+                <a:lnTo>
+                  <a:pt x="0" y="120000"/>
+                </a:lnTo>
+                <a:close/>
+              </a:path>
+            </a:pathLst>
+          </a:custGeom>
+        </p:spPr>
+      </p:sp>
+      <p:sp>
+        <p:nvSpPr>
+          <p:cNvPr id="52" name="Google Shape;52;p:notes"/>
+          <p:cNvSpPr txBox="1">
+            <a:spLocks noGrp="1"/>
+          </p:cNvSpPr>
+          <p:nvPr>
+            <p:ph type="body" idx="1"/>
+          </p:nvPr>
+        </p:nvSpPr>
+        <p:spPr>
+          <a:xfrm>
+            <a:off x="685800" y="4343400"/>
+            <a:ext cx="5486400" cy="4114800"/>
+          </a:xfrm>
+          <a:prstGeom prst="rect">
+            <a:avLst/>
+          </a:prstGeom>
+        </p:spPr>
+        <p:txBody>
+          <a:bodyPr spcFirstLastPara="1" wrap="square" lIns="91425" tIns="91425" rIns="91425" bIns="91425" anchor="t" anchorCtr="0">
+            <a:noAutofit/>
+          </a:bodyPr>
+          <a:lstStyle/>
+          <a:p>
+            <a:pPr marL="0" lvl="0" indent="0" algn="l" rtl="0">
+              <a:spcBef>
+                <a:spcPts val="0"/>
+              </a:spcBef>
+              <a:spcAft>
+                <a:spcPts val="0"/>
+              </a:spcAft>
+              <a:buNone/>
+            </a:pPr>
+            <a:endParaRPr/>
+          </a:p>
+        </p:txBody>
+      </p:sp>
+    </p:spTree>
+  </p:cSld>
+  <p:clrMapOvr>
+    <a:masterClrMapping/>
+  </p:clrMapOvr>
+</p:notes>
+</file>
+
+<file path=ppt/notesSlides/notesSlide2.xml><?xml version="1.0" encoding="utf-8"?>
+<p:notes xmlns:a="http://schemas.openxmlformats.org/drawingml/2006/main" xmlns:r="http://schemas.openxmlformats.org/officeDocument/2006/relationships" xmlns:p="http://schemas.openxmlformats.org/presentationml/2006/main" showMasterSp="0" showMasterPhAnim="0">
+  <p:cSld>
+    <p:spTree>
+      <p:nvGrpSpPr>
+        <p:cNvPr id="1" name="Shape 56"/>
+        <p:cNvGrpSpPr/>
+        <p:nvPr/>
+      </p:nvGrpSpPr>
+      <p:grpSpPr>
+        <a:xfrm>
+          <a:off x="0" y="0"/>
+          <a:ext cx="0" cy="0"/>
+          <a:chOff x="0" y="0"/>
+          <a:chExt cx="0" cy="0"/>
+        </a:xfrm>
+      </p:grpSpPr>
+      <p:sp>
+        <p:nvSpPr>
+          <p:cNvPr id="57" name="Google Shape;57;g171837bbc69_0_2:notes"/>
+          <p:cNvSpPr>
+            <a:spLocks noGrp="1" noRot="1" noChangeAspect="1"/>
+          </p:cNvSpPr>
+          <p:nvPr>
+            <p:ph type="sldImg" idx="2"/>
+          </p:nvPr>
+        </p:nvSpPr>
+        <p:spPr>
+          <a:xfrm>
+            <a:off x="381300" y="685800"/>
+            <a:ext cx="6096000" cy="3429000"/>
+          </a:xfrm>
+          <a:custGeom>
+            <a:avLst/>
+            <a:gdLst/>
+            <a:ahLst/>
+            <a:cxnLst/>
+            <a:rect l="l" t="t" r="r" b="b"/>
+            <a:pathLst>
+              <a:path w="120000" h="120000" extrusionOk="0">
+                <a:moveTo>
+                  <a:pt x="0" y="0"/>
+                </a:moveTo>
+                <a:lnTo>
+                  <a:pt x="120000" y="0"/>
+                </a:lnTo>
+                <a:lnTo>
+                  <a:pt x="120000" y="120000"/>
+                </a:lnTo>
+                <a:lnTo>
+                  <a:pt x="0" y="120000"/>
+                </a:lnTo>
+                <a:close/>
+              </a:path>
+            </a:pathLst>
+          </a:custGeom>
+        </p:spPr>
+      </p:sp>
+      <p:sp>
+        <p:nvSpPr>
+          <p:cNvPr id="58" name="Google Shape;58;g171837bbc69_0_2:notes"/>
+          <p:cNvSpPr txBox="1">
+            <a:spLocks noGrp="1"/>
+          </p:cNvSpPr>
+          <p:nvPr>
+            <p:ph type="body" idx="1"/>
+          </p:nvPr>
+        </p:nvSpPr>
+        <p:spPr>
+          <a:xfrm>
+            <a:off x="685800" y="4343400"/>
+            <a:ext cx="5486400" cy="4114800"/>
+          </a:xfrm>
+          <a:prstGeom prst="rect">
+            <a:avLst/>
+          </a:prstGeom>
+        </p:spPr>
+        <p:txBody>
+          <a:bodyPr spcFirstLastPara="1" wrap="square" lIns="91425" tIns="91425" rIns="91425" bIns="91425" anchor="t" anchorCtr="0">
+            <a:noAutofit/>
+          </a:bodyPr>
+          <a:lstStyle/>
+          <a:p>
+            <a:pPr marL="0" lvl="0" indent="0" algn="l" rtl="0">
+              <a:spcBef>
+                <a:spcPts val="0"/>
+              </a:spcBef>
+              <a:spcAft>
+                <a:spcPts val="0"/>
+              </a:spcAft>
+              <a:buNone/>
+            </a:pPr>
+            <a:endParaRPr/>
+          </a:p>
+        </p:txBody>
+      </p:sp>
+    </p:spTree>
+  </p:cSld>
+  <p:clrMapOvr>
+    <a:masterClrMapping/>
+  </p:clrMapOvr>
+</p:notes>
+</file>
+
+<file path=ppt/notesSlides/notesSlide3.xml><?xml version="1.0" encoding="utf-8"?>
+<p:notes xmlns:a="http://schemas.openxmlformats.org/drawingml/2006/main" xmlns:r="http://schemas.openxmlformats.org/officeDocument/2006/relationships" xmlns:p="http://schemas.openxmlformats.org/presentationml/2006/main" showMasterSp="0" showMasterPhAnim="0">
+  <p:cSld>
+    <p:spTree>
+      <p:nvGrpSpPr>
+        <p:cNvPr id="1" name="Shape 62"/>
+        <p:cNvGrpSpPr/>
+        <p:nvPr/>
+      </p:nvGrpSpPr>
+      <p:grpSpPr>
+        <a:xfrm>
+          <a:off x="0" y="0"/>
+          <a:ext cx="0" cy="0"/>
+          <a:chOff x="0" y="0"/>
+          <a:chExt cx="0" cy="0"/>
+        </a:xfrm>
+      </p:grpSpPr>
+      <p:sp>
+        <p:nvSpPr>
+          <p:cNvPr id="63" name="Google Shape;63;g171837bbc69_0_8:notes"/>
+          <p:cNvSpPr>
+            <a:spLocks noGrp="1" noRot="1" noChangeAspect="1"/>
+          </p:cNvSpPr>
+          <p:nvPr>
+            <p:ph type="sldImg" idx="2"/>
+          </p:nvPr>
+        </p:nvSpPr>
+        <p:spPr>
+          <a:xfrm>
+            <a:off x="381300" y="685800"/>
+            <a:ext cx="6096000" cy="3429000"/>
+          </a:xfrm>
+          <a:custGeom>
+            <a:avLst/>
+            <a:gdLst/>
+            <a:ahLst/>
+            <a:cxnLst/>
+            <a:rect l="l" t="t" r="r" b="b"/>
+            <a:pathLst>
+              <a:path w="120000" h="120000" extrusionOk="0">
+                <a:moveTo>
+                  <a:pt x="0" y="0"/>
+                </a:moveTo>
+                <a:lnTo>
+                  <a:pt x="120000" y="0"/>
+                </a:lnTo>
+                <a:lnTo>
+                  <a:pt x="120000" y="120000"/>
+                </a:lnTo>
+                <a:lnTo>
+                  <a:pt x="0" y="120000"/>
+                </a:lnTo>
+                <a:close/>
+              </a:path>
+            </a:pathLst>
+          </a:custGeom>
+        </p:spPr>
+      </p:sp>
+      <p:sp>
+        <p:nvSpPr>
+          <p:cNvPr id="64" name="Google Shape;64;g171837bbc69_0_8:notes"/>
+          <p:cNvSpPr txBox="1">
+            <a:spLocks noGrp="1"/>
+          </p:cNvSpPr>
+          <p:nvPr>
+            <p:ph type="body" idx="1"/>
+          </p:nvPr>
+        </p:nvSpPr>
+        <p:spPr>
+          <a:xfrm>
+            <a:off x="685800" y="4343400"/>
+            <a:ext cx="5486400" cy="4114800"/>
+          </a:xfrm>
+          <a:prstGeom prst="rect">
+            <a:avLst/>
+          </a:prstGeom>
+        </p:spPr>
+        <p:txBody>
+          <a:bodyPr spcFirstLastPara="1" wrap="square" lIns="91425" tIns="91425" rIns="91425" bIns="91425" anchor="t" anchorCtr="0">
+            <a:noAutofit/>
+          </a:bodyPr>
+          <a:lstStyle/>
+          <a:p>
+            <a:pPr marL="0" lvl="0" indent="0" algn="l" rtl="0">
+              <a:spcBef>
+                <a:spcPts val="0"/>
+              </a:spcBef>
+              <a:spcAft>
+                <a:spcPts val="0"/>
+              </a:spcAft>
+              <a:buNone/>
+            </a:pPr>
+            <a:endParaRPr/>
+          </a:p>
+        </p:txBody>
+      </p:sp>
+    </p:spTree>
+  </p:cSld>
+  <p:clrMapOvr>
+    <a:masterClrMapping/>
+  </p:clrMapOvr>
+</p:notes>
+</file>
+
+<file path=ppt/notesSlides/notesSlide4.xml><?xml version="1.0" encoding="utf-8"?>
+<p:notes xmlns:a="http://schemas.openxmlformats.org/drawingml/2006/main" xmlns:r="http://schemas.openxmlformats.org/officeDocument/2006/relationships" xmlns:p="http://schemas.openxmlformats.org/presentationml/2006/main" showMasterSp="0" showMasterPhAnim="0">
+  <p:cSld>
+    <p:spTree>
+      <p:nvGrpSpPr>
+        <p:cNvPr id="1" name="Shape 68"/>
+        <p:cNvGrpSpPr/>
+        <p:nvPr/>
+      </p:nvGrpSpPr>
+      <p:grpSpPr>
+        <a:xfrm>
+          <a:off x="0" y="0"/>
+          <a:ext cx="0" cy="0"/>
+          <a:chOff x="0" y="0"/>
+          <a:chExt cx="0" cy="0"/>
+        </a:xfrm>
+      </p:grpSpPr>
+      <p:sp>
+        <p:nvSpPr>
+          <p:cNvPr id="69" name="Google Shape;69;g171837bbc69_0_14:notes"/>
+          <p:cNvSpPr>
+            <a:spLocks noGrp="1" noRot="1" noChangeAspect="1"/>
+          </p:cNvSpPr>
+          <p:nvPr>
+            <p:ph type="sldImg" idx="2"/>
+          </p:nvPr>
+        </p:nvSpPr>
+        <p:spPr>
+          <a:xfrm>
+            <a:off x="381300" y="685800"/>
+            <a:ext cx="6096000" cy="3429000"/>
+          </a:xfrm>
+          <a:custGeom>
+            <a:avLst/>
+            <a:gdLst/>
+            <a:ahLst/>
+            <a:cxnLst/>
+            <a:rect l="l" t="t" r="r" b="b"/>
+            <a:pathLst>
+              <a:path w="120000" h="120000" extrusionOk="0">
+                <a:moveTo>
+                  <a:pt x="0" y="0"/>
+                </a:moveTo>
+                <a:lnTo>
+                  <a:pt x="120000" y="0"/>
+                </a:lnTo>
+                <a:lnTo>
+                  <a:pt x="120000" y="120000"/>
+                </a:lnTo>
+                <a:lnTo>
+                  <a:pt x="0" y="120000"/>
+                </a:lnTo>
+                <a:close/>
+              </a:path>
+            </a:pathLst>
+          </a:custGeom>
+        </p:spPr>
+      </p:sp>
+      <p:sp>
+        <p:nvSpPr>
+          <p:cNvPr id="70" name="Google Shape;70;g171837bbc69_0_14:notes"/>
+          <p:cNvSpPr txBox="1">
+            <a:spLocks noGrp="1"/>
+          </p:cNvSpPr>
+          <p:nvPr>
+            <p:ph type="body" idx="1"/>
+          </p:nvPr>
+        </p:nvSpPr>
+        <p:spPr>
+          <a:xfrm>
+            <a:off x="685800" y="4343400"/>
+            <a:ext cx="5486400" cy="4114800"/>
+          </a:xfrm>
+          <a:prstGeom prst="rect">
+            <a:avLst/>
+          </a:prstGeom>
+        </p:spPr>
+        <p:txBody>
+          <a:bodyPr spcFirstLastPara="1" wrap="square" lIns="91425" tIns="91425" rIns="91425" bIns="91425" anchor="t" anchorCtr="0">
+            <a:noAutofit/>
+          </a:bodyPr>
+          <a:lstStyle/>
+          <a:p>
+            <a:pPr marL="0" lvl="0" indent="0" algn="l" rtl="0">
+              <a:spcBef>
+                <a:spcPts val="0"/>
+              </a:spcBef>
+              <a:spcAft>
+                <a:spcPts val="0"/>
+              </a:spcAft>
+              <a:buNone/>
+            </a:pPr>
+            <a:endParaRPr/>
+          </a:p>
+        </p:txBody>
+      </p:sp>
+    </p:spTree>
+  </p:cSld>
+  <p:clrMapOvr>
+    <a:masterClrMapping/>
+  </p:clrMapOvr>
+</p:notes>
+</file>
+
+<file path=ppt/notesSlides/notesSlide5.xml><?xml version="1.0" encoding="utf-8"?>
+<p:notes xmlns:a="http://schemas.openxmlformats.org/drawingml/2006/main" xmlns:r="http://schemas.openxmlformats.org/officeDocument/2006/relationships" xmlns:p="http://schemas.openxmlformats.org/presentationml/2006/main" showMasterSp="0" showMasterPhAnim="0">
+  <p:cSld>
+    <p:spTree>
+      <p:nvGrpSpPr>
+        <p:cNvPr id="1" name="Shape 50"/>
+        <p:cNvGrpSpPr/>
+        <p:nvPr/>
+      </p:nvGrpSpPr>
+      <p:grpSpPr>
+        <a:xfrm>
+          <a:off x="0" y="0"/>
+          <a:ext cx="0" cy="0"/>
+          <a:chOff x="0" y="0"/>
+          <a:chExt cx="0" cy="0"/>
+        </a:xfrm>
+      </p:grpSpPr>
+      <p:sp>
+        <p:nvSpPr>
+          <p:cNvPr id="51" name="Google Shape;51;p:notes"/>
+          <p:cNvSpPr>
+            <a:spLocks noGrp="1" noRot="1" noChangeAspect="1"/>
+          </p:cNvSpPr>
+          <p:nvPr>
+            <p:ph type="sldImg" idx="2"/>
+          </p:nvPr>
+        </p:nvSpPr>
+        <p:spPr>
+          <a:xfrm>
+            <a:off x="381000" y="685800"/>
+            <a:ext cx="6096000" cy="3429000"/>
+          </a:xfrm>
+          <a:custGeom>
+            <a:avLst/>
+            <a:gdLst/>
+            <a:ahLst/>
+            <a:cxnLst/>
+            <a:rect l="l" t="t" r="r" b="b"/>
+            <a:pathLst>
+              <a:path w="120000" h="120000" extrusionOk="0">
+                <a:moveTo>
+                  <a:pt x="0" y="0"/>
+                </a:moveTo>
+                <a:lnTo>
+                  <a:pt x="120000" y="0"/>
+                </a:lnTo>
+                <a:lnTo>
+                  <a:pt x="120000" y="120000"/>
+                </a:lnTo>
+                <a:lnTo>
+                  <a:pt x="0" y="120000"/>
+                </a:lnTo>
+                <a:close/>
+              </a:path>
+            </a:pathLst>
+          </a:custGeom>
+        </p:spPr>
+      </p:sp>
+      <p:sp>
+        <p:nvSpPr>
+          <p:cNvPr id="52" name="Google Shape;52;p:notes"/>
+          <p:cNvSpPr txBox="1">
+            <a:spLocks noGrp="1"/>
+          </p:cNvSpPr>
+          <p:nvPr>
+            <p:ph type="body" idx="1"/>
+          </p:nvPr>
+        </p:nvSpPr>
+        <p:spPr>
+          <a:xfrm>
+            <a:off x="685800" y="4343400"/>
+            <a:ext cx="5486400" cy="4114800"/>
+          </a:xfrm>
+          <a:prstGeom prst="rect">
+            <a:avLst/>
+          </a:prstGeom>
+        </p:spPr>
+        <p:txBody>
+          <a:bodyPr spcFirstLastPara="1" wrap="square" lIns="91425" tIns="91425" rIns="91425" bIns="91425" anchor="t" anchorCtr="0">
+            <a:noAutofit/>
+          </a:bodyPr>
+          <a:lstStyle/>
+          <a:p>
+            <a:pPr marL="0" lvl="0" indent="0" algn="l" rtl="0">
+              <a:spcBef>
+                <a:spcPts val="0"/>
+              </a:spcBef>
+              <a:spcAft>
+                <a:spcPts val="0"/>
+              </a:spcAft>
+              <a:buNone/>
+            </a:pPr>
+            <a:endParaRPr/>
+          </a:p>
+        </p:txBody>
+      </p:sp>
+    </p:spTree>
+    <p:extLst>
+      <p:ext uri="{BB962C8B-B14F-4D97-AF65-F5344CB8AC3E}">
+        <p14:creationId xmlns:p14="http://schemas.microsoft.com/office/powerpoint/2010/main" val="1039732796"/>
+      </p:ext>
+    </p:extLst>
+  </p:cSld>
+  <p:clrMapOvr>
+    <a:masterClrMapping/>
+  </p:clrMapOvr>
+</p:notes>
+</file>
+
 <file path=ppt/slideLayouts/slideLayout1.xml><?xml version="1.0" encoding="utf-8"?>
 <p:sldLayout xmlns:a="http://schemas.openxmlformats.org/drawingml/2006/main" xmlns:r="http://schemas.openxmlformats.org/officeDocument/2006/relationships" xmlns:p="http://schemas.openxmlformats.org/presentationml/2006/main" type="title" preserve="1">
   <p:cSld name="Title Slide">
@@ -15158,7 +16041,7 @@
           <a:p>
             <a:fld id="{290D0612-FE56-2F43-BA02-21BC6FAF1597}" type="datetimeFigureOut">
               <a:rPr lang="en-US" smtClean="0"/>
-              <a:t>10/22/2022</a:t>
+              <a:t>10/22/22</a:t>
             </a:fld>
             <a:endParaRPr lang="en-US"/>
           </a:p>
@@ -15358,7 +16241,7 @@
           <a:p>
             <a:fld id="{290D0612-FE56-2F43-BA02-21BC6FAF1597}" type="datetimeFigureOut">
               <a:rPr lang="en-US" smtClean="0"/>
-              <a:t>10/22/2022</a:t>
+              <a:t>10/22/22</a:t>
             </a:fld>
             <a:endParaRPr lang="en-US"/>
           </a:p>
@@ -15568,7 +16451,7 @@
           <a:p>
             <a:fld id="{290D0612-FE56-2F43-BA02-21BC6FAF1597}" type="datetimeFigureOut">
               <a:rPr lang="en-US" smtClean="0"/>
-              <a:t>10/22/2022</a:t>
+              <a:t>10/22/22</a:t>
             </a:fld>
             <a:endParaRPr lang="en-US"/>
           </a:p>
@@ -15632,6 +16515,365 @@
     <p:extLst>
       <p:ext uri="{BB962C8B-B14F-4D97-AF65-F5344CB8AC3E}">
         <p14:creationId xmlns:p14="http://schemas.microsoft.com/office/powerpoint/2010/main" val="2933405844"/>
+      </p:ext>
+    </p:extLst>
+  </p:cSld>
+  <p:clrMapOvr>
+    <a:masterClrMapping/>
+  </p:clrMapOvr>
+</p:sldLayout>
+</file>
+
+<file path=ppt/slideLayouts/slideLayout12.xml><?xml version="1.0" encoding="utf-8"?>
+<p:sldLayout xmlns:a="http://schemas.openxmlformats.org/drawingml/2006/main" xmlns:r="http://schemas.openxmlformats.org/officeDocument/2006/relationships" xmlns:p="http://schemas.openxmlformats.org/presentationml/2006/main" matchingName="Title and body" type="tx">
+  <p:cSld name="Title and body">
+    <p:spTree>
+      <p:nvGrpSpPr>
+        <p:cNvPr id="1" name="Shape 16"/>
+        <p:cNvGrpSpPr/>
+        <p:nvPr/>
+      </p:nvGrpSpPr>
+      <p:grpSpPr>
+        <a:xfrm>
+          <a:off x="0" y="0"/>
+          <a:ext cx="0" cy="0"/>
+          <a:chOff x="0" y="0"/>
+          <a:chExt cx="0" cy="0"/>
+        </a:xfrm>
+      </p:grpSpPr>
+      <p:sp>
+        <p:nvSpPr>
+          <p:cNvPr id="17" name="Google Shape;17;p4"/>
+          <p:cNvSpPr txBox="1">
+            <a:spLocks noGrp="1"/>
+          </p:cNvSpPr>
+          <p:nvPr>
+            <p:ph type="title"/>
+          </p:nvPr>
+        </p:nvSpPr>
+        <p:spPr>
+          <a:xfrm>
+            <a:off x="415600" y="593367"/>
+            <a:ext cx="11360800" cy="763600"/>
+          </a:xfrm>
+          <a:prstGeom prst="rect">
+            <a:avLst/>
+          </a:prstGeom>
+        </p:spPr>
+        <p:txBody>
+          <a:bodyPr spcFirstLastPara="1" wrap="square" lIns="91425" tIns="91425" rIns="91425" bIns="91425" anchor="t" anchorCtr="0">
+            <a:normAutofit/>
+          </a:bodyPr>
+          <a:lstStyle>
+            <a:lvl1pPr lvl="0">
+              <a:spcBef>
+                <a:spcPts val="0"/>
+              </a:spcBef>
+              <a:spcAft>
+                <a:spcPts val="0"/>
+              </a:spcAft>
+              <a:buSzPts val="2800"/>
+              <a:buNone/>
+              <a:defRPr/>
+            </a:lvl1pPr>
+            <a:lvl2pPr lvl="1">
+              <a:spcBef>
+                <a:spcPts val="0"/>
+              </a:spcBef>
+              <a:spcAft>
+                <a:spcPts val="0"/>
+              </a:spcAft>
+              <a:buSzPts val="2800"/>
+              <a:buNone/>
+              <a:defRPr/>
+            </a:lvl2pPr>
+            <a:lvl3pPr lvl="2">
+              <a:spcBef>
+                <a:spcPts val="0"/>
+              </a:spcBef>
+              <a:spcAft>
+                <a:spcPts val="0"/>
+              </a:spcAft>
+              <a:buSzPts val="2800"/>
+              <a:buNone/>
+              <a:defRPr/>
+            </a:lvl3pPr>
+            <a:lvl4pPr lvl="3">
+              <a:spcBef>
+                <a:spcPts val="0"/>
+              </a:spcBef>
+              <a:spcAft>
+                <a:spcPts val="0"/>
+              </a:spcAft>
+              <a:buSzPts val="2800"/>
+              <a:buNone/>
+              <a:defRPr/>
+            </a:lvl4pPr>
+            <a:lvl5pPr lvl="4">
+              <a:spcBef>
+                <a:spcPts val="0"/>
+              </a:spcBef>
+              <a:spcAft>
+                <a:spcPts val="0"/>
+              </a:spcAft>
+              <a:buSzPts val="2800"/>
+              <a:buNone/>
+              <a:defRPr/>
+            </a:lvl5pPr>
+            <a:lvl6pPr lvl="5">
+              <a:spcBef>
+                <a:spcPts val="0"/>
+              </a:spcBef>
+              <a:spcAft>
+                <a:spcPts val="0"/>
+              </a:spcAft>
+              <a:buSzPts val="2800"/>
+              <a:buNone/>
+              <a:defRPr/>
+            </a:lvl6pPr>
+            <a:lvl7pPr lvl="6">
+              <a:spcBef>
+                <a:spcPts val="0"/>
+              </a:spcBef>
+              <a:spcAft>
+                <a:spcPts val="0"/>
+              </a:spcAft>
+              <a:buSzPts val="2800"/>
+              <a:buNone/>
+              <a:defRPr/>
+            </a:lvl7pPr>
+            <a:lvl8pPr lvl="7">
+              <a:spcBef>
+                <a:spcPts val="0"/>
+              </a:spcBef>
+              <a:spcAft>
+                <a:spcPts val="0"/>
+              </a:spcAft>
+              <a:buSzPts val="2800"/>
+              <a:buNone/>
+              <a:defRPr/>
+            </a:lvl8pPr>
+            <a:lvl9pPr lvl="8">
+              <a:spcBef>
+                <a:spcPts val="0"/>
+              </a:spcBef>
+              <a:spcAft>
+                <a:spcPts val="0"/>
+              </a:spcAft>
+              <a:buSzPts val="2800"/>
+              <a:buNone/>
+              <a:defRPr/>
+            </a:lvl9pPr>
+          </a:lstStyle>
+          <a:p>
+            <a:endParaRPr/>
+          </a:p>
+        </p:txBody>
+      </p:sp>
+      <p:sp>
+        <p:nvSpPr>
+          <p:cNvPr id="18" name="Google Shape;18;p4"/>
+          <p:cNvSpPr txBox="1">
+            <a:spLocks noGrp="1"/>
+          </p:cNvSpPr>
+          <p:nvPr>
+            <p:ph type="body" idx="1"/>
+          </p:nvPr>
+        </p:nvSpPr>
+        <p:spPr>
+          <a:xfrm>
+            <a:off x="415600" y="1536633"/>
+            <a:ext cx="11360800" cy="4555200"/>
+          </a:xfrm>
+          <a:prstGeom prst="rect">
+            <a:avLst/>
+          </a:prstGeom>
+        </p:spPr>
+        <p:txBody>
+          <a:bodyPr spcFirstLastPara="1" wrap="square" lIns="91425" tIns="91425" rIns="91425" bIns="91425" anchor="t" anchorCtr="0">
+            <a:normAutofit/>
+          </a:bodyPr>
+          <a:lstStyle>
+            <a:lvl1pPr marL="609585" lvl="0" indent="-457189">
+              <a:spcBef>
+                <a:spcPts val="0"/>
+              </a:spcBef>
+              <a:spcAft>
+                <a:spcPts val="0"/>
+              </a:spcAft>
+              <a:buSzPts val="1800"/>
+              <a:buChar char="●"/>
+              <a:defRPr/>
+            </a:lvl1pPr>
+            <a:lvl2pPr marL="1219170" lvl="1" indent="-423323">
+              <a:spcBef>
+                <a:spcPts val="0"/>
+              </a:spcBef>
+              <a:spcAft>
+                <a:spcPts val="0"/>
+              </a:spcAft>
+              <a:buSzPts val="1400"/>
+              <a:buChar char="○"/>
+              <a:defRPr/>
+            </a:lvl2pPr>
+            <a:lvl3pPr marL="1828754" lvl="2" indent="-423323">
+              <a:spcBef>
+                <a:spcPts val="0"/>
+              </a:spcBef>
+              <a:spcAft>
+                <a:spcPts val="0"/>
+              </a:spcAft>
+              <a:buSzPts val="1400"/>
+              <a:buChar char="■"/>
+              <a:defRPr/>
+            </a:lvl3pPr>
+            <a:lvl4pPr marL="2438339" lvl="3" indent="-423323">
+              <a:spcBef>
+                <a:spcPts val="0"/>
+              </a:spcBef>
+              <a:spcAft>
+                <a:spcPts val="0"/>
+              </a:spcAft>
+              <a:buSzPts val="1400"/>
+              <a:buChar char="●"/>
+              <a:defRPr/>
+            </a:lvl4pPr>
+            <a:lvl5pPr marL="3047924" lvl="4" indent="-423323">
+              <a:spcBef>
+                <a:spcPts val="0"/>
+              </a:spcBef>
+              <a:spcAft>
+                <a:spcPts val="0"/>
+              </a:spcAft>
+              <a:buSzPts val="1400"/>
+              <a:buChar char="○"/>
+              <a:defRPr/>
+            </a:lvl5pPr>
+            <a:lvl6pPr marL="3657509" lvl="5" indent="-423323">
+              <a:spcBef>
+                <a:spcPts val="0"/>
+              </a:spcBef>
+              <a:spcAft>
+                <a:spcPts val="0"/>
+              </a:spcAft>
+              <a:buSzPts val="1400"/>
+              <a:buChar char="■"/>
+              <a:defRPr/>
+            </a:lvl6pPr>
+            <a:lvl7pPr marL="4267093" lvl="6" indent="-423323">
+              <a:spcBef>
+                <a:spcPts val="0"/>
+              </a:spcBef>
+              <a:spcAft>
+                <a:spcPts val="0"/>
+              </a:spcAft>
+              <a:buSzPts val="1400"/>
+              <a:buChar char="●"/>
+              <a:defRPr/>
+            </a:lvl7pPr>
+            <a:lvl8pPr marL="4876678" lvl="7" indent="-423323">
+              <a:spcBef>
+                <a:spcPts val="0"/>
+              </a:spcBef>
+              <a:spcAft>
+                <a:spcPts val="0"/>
+              </a:spcAft>
+              <a:buSzPts val="1400"/>
+              <a:buChar char="○"/>
+              <a:defRPr/>
+            </a:lvl8pPr>
+            <a:lvl9pPr marL="5486263" lvl="8" indent="-423323">
+              <a:spcBef>
+                <a:spcPts val="0"/>
+              </a:spcBef>
+              <a:spcAft>
+                <a:spcPts val="0"/>
+              </a:spcAft>
+              <a:buSzPts val="1400"/>
+              <a:buChar char="■"/>
+              <a:defRPr/>
+            </a:lvl9pPr>
+          </a:lstStyle>
+          <a:p>
+            <a:endParaRPr/>
+          </a:p>
+        </p:txBody>
+      </p:sp>
+      <p:sp>
+        <p:nvSpPr>
+          <p:cNvPr id="19" name="Google Shape;19;p4"/>
+          <p:cNvSpPr txBox="1">
+            <a:spLocks noGrp="1"/>
+          </p:cNvSpPr>
+          <p:nvPr>
+            <p:ph type="sldNum" idx="12"/>
+          </p:nvPr>
+        </p:nvSpPr>
+        <p:spPr>
+          <a:xfrm>
+            <a:off x="11296611" y="6217623"/>
+            <a:ext cx="731600" cy="524800"/>
+          </a:xfrm>
+          <a:prstGeom prst="rect">
+            <a:avLst/>
+          </a:prstGeom>
+        </p:spPr>
+        <p:txBody>
+          <a:bodyPr spcFirstLastPara="1" wrap="square" lIns="91425" tIns="91425" rIns="91425" bIns="91425" anchor="ctr" anchorCtr="0">
+            <a:normAutofit/>
+          </a:bodyPr>
+          <a:lstStyle>
+            <a:lvl1pPr lvl="0">
+              <a:buNone/>
+              <a:defRPr/>
+            </a:lvl1pPr>
+            <a:lvl2pPr lvl="1">
+              <a:buNone/>
+              <a:defRPr/>
+            </a:lvl2pPr>
+            <a:lvl3pPr lvl="2">
+              <a:buNone/>
+              <a:defRPr/>
+            </a:lvl3pPr>
+            <a:lvl4pPr lvl="3">
+              <a:buNone/>
+              <a:defRPr/>
+            </a:lvl4pPr>
+            <a:lvl5pPr lvl="4">
+              <a:buNone/>
+              <a:defRPr/>
+            </a:lvl5pPr>
+            <a:lvl6pPr lvl="5">
+              <a:buNone/>
+              <a:defRPr/>
+            </a:lvl6pPr>
+            <a:lvl7pPr lvl="6">
+              <a:buNone/>
+              <a:defRPr/>
+            </a:lvl7pPr>
+            <a:lvl8pPr lvl="7">
+              <a:buNone/>
+              <a:defRPr/>
+            </a:lvl8pPr>
+            <a:lvl9pPr lvl="8">
+              <a:buNone/>
+              <a:defRPr/>
+            </a:lvl9pPr>
+          </a:lstStyle>
+          <a:p>
+            <a:fld id="{00000000-1234-1234-1234-123412341234}" type="slidenum">
+              <a:rPr lang="en-GB" smtClean="0"/>
+              <a:pPr/>
+              <a:t>‹#›</a:t>
+            </a:fld>
+            <a:endParaRPr lang="en-GB"/>
+          </a:p>
+        </p:txBody>
+      </p:sp>
+    </p:spTree>
+    <p:extLst>
+      <p:ext uri="{BB962C8B-B14F-4D97-AF65-F5344CB8AC3E}">
+        <p14:creationId xmlns:p14="http://schemas.microsoft.com/office/powerpoint/2010/main" val="4083053816"/>
       </p:ext>
     </p:extLst>
   </p:cSld>
@@ -15768,7 +17010,7 @@
           <a:p>
             <a:fld id="{290D0612-FE56-2F43-BA02-21BC6FAF1597}" type="datetimeFigureOut">
               <a:rPr lang="en-US" smtClean="0"/>
-              <a:t>10/22/2022</a:t>
+              <a:t>10/22/22</a:t>
             </a:fld>
             <a:endParaRPr lang="en-US"/>
           </a:p>
@@ -16044,7 +17286,7 @@
           <a:p>
             <a:fld id="{290D0612-FE56-2F43-BA02-21BC6FAF1597}" type="datetimeFigureOut">
               <a:rPr lang="en-US" smtClean="0"/>
-              <a:t>10/22/2022</a:t>
+              <a:t>10/22/22</a:t>
             </a:fld>
             <a:endParaRPr lang="en-US"/>
           </a:p>
@@ -16312,7 +17554,7 @@
           <a:p>
             <a:fld id="{290D0612-FE56-2F43-BA02-21BC6FAF1597}" type="datetimeFigureOut">
               <a:rPr lang="en-US" smtClean="0"/>
-              <a:t>10/22/2022</a:t>
+              <a:t>10/22/22</a:t>
             </a:fld>
             <a:endParaRPr lang="en-US"/>
           </a:p>
@@ -16727,7 +17969,7 @@
           <a:p>
             <a:fld id="{290D0612-FE56-2F43-BA02-21BC6FAF1597}" type="datetimeFigureOut">
               <a:rPr lang="en-US" smtClean="0"/>
-              <a:t>10/22/2022</a:t>
+              <a:t>10/22/22</a:t>
             </a:fld>
             <a:endParaRPr lang="en-US"/>
           </a:p>
@@ -16869,7 +18111,7 @@
           <a:p>
             <a:fld id="{290D0612-FE56-2F43-BA02-21BC6FAF1597}" type="datetimeFigureOut">
               <a:rPr lang="en-US" smtClean="0"/>
-              <a:t>10/22/2022</a:t>
+              <a:t>10/22/22</a:t>
             </a:fld>
             <a:endParaRPr lang="en-US"/>
           </a:p>
@@ -16982,7 +18224,7 @@
           <a:p>
             <a:fld id="{290D0612-FE56-2F43-BA02-21BC6FAF1597}" type="datetimeFigureOut">
               <a:rPr lang="en-US" smtClean="0"/>
-              <a:t>10/22/2022</a:t>
+              <a:t>10/22/22</a:t>
             </a:fld>
             <a:endParaRPr lang="en-US"/>
           </a:p>
@@ -17295,7 +18537,7 @@
           <a:p>
             <a:fld id="{290D0612-FE56-2F43-BA02-21BC6FAF1597}" type="datetimeFigureOut">
               <a:rPr lang="en-US" smtClean="0"/>
-              <a:t>10/22/2022</a:t>
+              <a:t>10/22/22</a:t>
             </a:fld>
             <a:endParaRPr lang="en-US"/>
           </a:p>
@@ -17584,7 +18826,7 @@
           <a:p>
             <a:fld id="{290D0612-FE56-2F43-BA02-21BC6FAF1597}" type="datetimeFigureOut">
               <a:rPr lang="en-US" smtClean="0"/>
-              <a:t>10/22/2022</a:t>
+              <a:t>10/22/22</a:t>
             </a:fld>
             <a:endParaRPr lang="en-US"/>
           </a:p>
@@ -17827,7 +19069,7 @@
           <a:p>
             <a:fld id="{290D0612-FE56-2F43-BA02-21BC6FAF1597}" type="datetimeFigureOut">
               <a:rPr lang="en-US" smtClean="0"/>
-              <a:t>10/22/2022</a:t>
+              <a:t>10/22/22</a:t>
             </a:fld>
             <a:endParaRPr lang="en-US"/>
           </a:p>
@@ -17943,6 +19185,7 @@
     <p:sldLayoutId id="2147483657" r:id="rId9"/>
     <p:sldLayoutId id="2147483658" r:id="rId10"/>
     <p:sldLayoutId id="2147483659" r:id="rId11"/>
+    <p:sldLayoutId id="2147483660" r:id="rId12"/>
   </p:sldLayoutIdLst>
   <p:txStyles>
     <p:titleStyle>
@@ -18265,7 +19508,10 @@
           <a:bodyPr/>
           <a:lstStyle/>
           <a:p>
-            <a:endParaRPr lang="en-US"/>
+            <a:r>
+              <a:rPr lang="en-US" dirty="0"/>
+              <a:t>Customer Relationship Management</a:t>
+            </a:r>
           </a:p>
         </p:txBody>
       </p:sp>
@@ -18290,7 +19536,32 @@
           <a:bodyPr/>
           <a:lstStyle/>
           <a:p>
-            <a:endParaRPr lang="en-US"/>
+            <a:endParaRPr lang="en-US" dirty="0"/>
+          </a:p>
+          <a:p>
+            <a:r>
+              <a:rPr lang="en-US" dirty="0"/>
+              <a:t>Team Members : Vishal S, </a:t>
+            </a:r>
+            <a:r>
+              <a:rPr lang="en-US" dirty="0" err="1"/>
+              <a:t>Hari.k</a:t>
+            </a:r>
+            <a:r>
+              <a:rPr lang="en-US" dirty="0"/>
+              <a:t> , </a:t>
+            </a:r>
+            <a:r>
+              <a:rPr lang="en-US" dirty="0" err="1"/>
+              <a:t>Sumanth.D</a:t>
+            </a:r>
+            <a:r>
+              <a:rPr lang="en-US" dirty="0"/>
+              <a:t>, Chinmay</a:t>
+            </a:r>
+          </a:p>
+          <a:p>
+            <a:endParaRPr lang="en-US" dirty="0"/>
           </a:p>
         </p:txBody>
       </p:sp>
@@ -18308,177 +19579,6 @@
 </file>
 
 <file path=ppt/slides/slide10.xml><?xml version="1.0" encoding="utf-8"?>
-<p:sld xmlns:a="http://schemas.openxmlformats.org/drawingml/2006/main" xmlns:r="http://schemas.openxmlformats.org/officeDocument/2006/relationships" xmlns:p="http://schemas.openxmlformats.org/presentationml/2006/main">
-  <p:cSld>
-    <p:spTree>
-      <p:nvGrpSpPr>
-        <p:cNvPr id="1" name=""/>
-        <p:cNvGrpSpPr/>
-        <p:nvPr/>
-      </p:nvGrpSpPr>
-      <p:grpSpPr>
-        <a:xfrm>
-          <a:off x="0" y="0"/>
-          <a:ext cx="0" cy="0"/>
-          <a:chOff x="0" y="0"/>
-          <a:chExt cx="0" cy="0"/>
-        </a:xfrm>
-      </p:grpSpPr>
-      <p:sp>
-        <p:nvSpPr>
-          <p:cNvPr id="2" name="Title 1">
-            <a:extLst>
-              <a:ext uri="{FF2B5EF4-FFF2-40B4-BE49-F238E27FC236}">
-                <a16:creationId xmlns:a16="http://schemas.microsoft.com/office/drawing/2014/main" id="{A964E05A-4D53-BB29-DD48-4B7738902BEF}"/>
-              </a:ext>
-            </a:extLst>
-          </p:cNvPr>
-          <p:cNvSpPr>
-            <a:spLocks noGrp="1"/>
-          </p:cNvSpPr>
-          <p:nvPr>
-            <p:ph type="title"/>
-          </p:nvPr>
-        </p:nvSpPr>
-        <p:spPr/>
-        <p:txBody>
-          <a:bodyPr/>
-          <a:lstStyle/>
-          <a:p>
-            <a:r>
-              <a:rPr lang="en-IN" dirty="0"/>
-              <a:t>Results</a:t>
-            </a:r>
-          </a:p>
-        </p:txBody>
-      </p:sp>
-      <p:graphicFrame>
-        <p:nvGraphicFramePr>
-          <p:cNvPr id="5" name="Content Placeholder 2">
-            <a:extLst>
-              <a:ext uri="{FF2B5EF4-FFF2-40B4-BE49-F238E27FC236}">
-                <a16:creationId xmlns:a16="http://schemas.microsoft.com/office/drawing/2014/main" id="{845B2137-069F-18DB-489A-2A7DBF88626C}"/>
-              </a:ext>
-            </a:extLst>
-          </p:cNvPr>
-          <p:cNvGraphicFramePr>
-            <a:graphicFrameLocks noGrp="1"/>
-          </p:cNvGraphicFramePr>
-          <p:nvPr>
-            <p:ph idx="1"/>
-          </p:nvPr>
-        </p:nvGraphicFramePr>
-        <p:xfrm>
-          <a:off x="838200" y="1825625"/>
-          <a:ext cx="10515600" cy="4351338"/>
-        </p:xfrm>
-        <a:graphic>
-          <a:graphicData uri="http://schemas.openxmlformats.org/drawingml/2006/diagram">
-            <dgm:relIds xmlns:dgm="http://schemas.openxmlformats.org/drawingml/2006/diagram" xmlns:r="http://schemas.openxmlformats.org/officeDocument/2006/relationships" r:dm="rId2" r:lo="rId3" r:qs="rId4" r:cs="rId5"/>
-          </a:graphicData>
-        </a:graphic>
-      </p:graphicFrame>
-    </p:spTree>
-    <p:extLst>
-      <p:ext uri="{BB962C8B-B14F-4D97-AF65-F5344CB8AC3E}">
-        <p14:creationId xmlns:p14="http://schemas.microsoft.com/office/powerpoint/2010/main" val="489146656"/>
-      </p:ext>
-    </p:extLst>
-  </p:cSld>
-  <p:clrMapOvr>
-    <a:masterClrMapping/>
-  </p:clrMapOvr>
-</p:sld>
-</file>
-
-<file path=ppt/slides/slide11.xml><?xml version="1.0" encoding="utf-8"?>
-<p:sld xmlns:a="http://schemas.openxmlformats.org/drawingml/2006/main" xmlns:r="http://schemas.openxmlformats.org/officeDocument/2006/relationships" xmlns:p="http://schemas.openxmlformats.org/presentationml/2006/main">
-  <p:cSld>
-    <p:spTree>
-      <p:nvGrpSpPr>
-        <p:cNvPr id="1" name=""/>
-        <p:cNvGrpSpPr/>
-        <p:nvPr/>
-      </p:nvGrpSpPr>
-      <p:grpSpPr>
-        <a:xfrm>
-          <a:off x="0" y="0"/>
-          <a:ext cx="0" cy="0"/>
-          <a:chOff x="0" y="0"/>
-          <a:chExt cx="0" cy="0"/>
-        </a:xfrm>
-      </p:grpSpPr>
-      <p:sp>
-        <p:nvSpPr>
-          <p:cNvPr id="2" name="Title 1">
-            <a:extLst>
-              <a:ext uri="{FF2B5EF4-FFF2-40B4-BE49-F238E27FC236}">
-                <a16:creationId xmlns:a16="http://schemas.microsoft.com/office/drawing/2014/main" id="{818512EA-7D4E-B7E4-7D3D-B0C943C6755F}"/>
-              </a:ext>
-            </a:extLst>
-          </p:cNvPr>
-          <p:cNvSpPr>
-            <a:spLocks noGrp="1"/>
-          </p:cNvSpPr>
-          <p:nvPr>
-            <p:ph type="title"/>
-          </p:nvPr>
-        </p:nvSpPr>
-        <p:spPr/>
-        <p:txBody>
-          <a:bodyPr/>
-          <a:lstStyle/>
-          <a:p>
-            <a:r>
-              <a:rPr lang="en-US" dirty="0"/>
-              <a:t>Gradient Boosting</a:t>
-            </a:r>
-          </a:p>
-        </p:txBody>
-      </p:sp>
-      <p:pic>
-        <p:nvPicPr>
-          <p:cNvPr id="5" name="Content Placeholder 4">
-            <a:extLst>
-              <a:ext uri="{FF2B5EF4-FFF2-40B4-BE49-F238E27FC236}">
-                <a16:creationId xmlns:a16="http://schemas.microsoft.com/office/drawing/2014/main" id="{88E484E5-F897-A1BC-A2C9-231252585664}"/>
-              </a:ext>
-            </a:extLst>
-          </p:cNvPr>
-          <p:cNvPicPr>
-            <a:picLocks noGrp="1" noChangeAspect="1"/>
-          </p:cNvPicPr>
-          <p:nvPr>
-            <p:ph idx="1"/>
-          </p:nvPr>
-        </p:nvPicPr>
-        <p:blipFill>
-          <a:blip r:embed="rId2"/>
-          <a:stretch>
-            <a:fillRect/>
-          </a:stretch>
-        </p:blipFill>
-        <p:spPr>
-          <a:xfrm>
-            <a:off x="838199" y="1690687"/>
-            <a:ext cx="10406301" cy="4514903"/>
-          </a:xfrm>
-        </p:spPr>
-      </p:pic>
-    </p:spTree>
-    <p:extLst>
-      <p:ext uri="{BB962C8B-B14F-4D97-AF65-F5344CB8AC3E}">
-        <p14:creationId xmlns:p14="http://schemas.microsoft.com/office/powerpoint/2010/main" val="35805409"/>
-      </p:ext>
-    </p:extLst>
-  </p:cSld>
-  <p:clrMapOvr>
-    <a:masterClrMapping/>
-  </p:clrMapOvr>
-</p:sld>
-</file>
-
-<file path=ppt/slides/slide12.xml><?xml version="1.0" encoding="utf-8"?>
 <p:sld xmlns:a="http://schemas.openxmlformats.org/drawingml/2006/main" xmlns:r="http://schemas.openxmlformats.org/officeDocument/2006/relationships" xmlns:p="http://schemas.openxmlformats.org/presentationml/2006/main">
   <p:cSld>
     <p:spTree>
@@ -18595,7 +19695,7 @@
 </p:sld>
 </file>
 
-<file path=ppt/slides/slide13.xml><?xml version="1.0" encoding="utf-8"?>
+<file path=ppt/slides/slide11.xml><?xml version="1.0" encoding="utf-8"?>
 <p:sld xmlns:a="http://schemas.openxmlformats.org/drawingml/2006/main" xmlns:r="http://schemas.openxmlformats.org/officeDocument/2006/relationships" xmlns:p="http://schemas.openxmlformats.org/presentationml/2006/main">
   <p:cSld>
     <p:spTree>
@@ -18617,7 +19717,7 @@
           <p:cNvPr id="2" name="Title 1">
             <a:extLst>
               <a:ext uri="{FF2B5EF4-FFF2-40B4-BE49-F238E27FC236}">
-                <a16:creationId xmlns:a16="http://schemas.microsoft.com/office/drawing/2014/main" id="{CCC8767D-8FC8-C056-FEF9-5F5C88B73D35}"/>
+                <a16:creationId xmlns:a16="http://schemas.microsoft.com/office/drawing/2014/main" id="{A964E05A-4D53-BB29-DD48-4B7738902BEF}"/>
               </a:ext>
             </a:extLst>
           </p:cNvPr>
@@ -18634,75 +19734,42 @@
           <a:lstStyle/>
           <a:p>
             <a:r>
-              <a:rPr lang="en-US" dirty="0"/>
-              <a:t>Performance – GBC on sample weights</a:t>
+              <a:rPr lang="en-IN" dirty="0"/>
+              <a:t>Logistic Regression Results</a:t>
             </a:r>
           </a:p>
         </p:txBody>
       </p:sp>
-      <p:pic>
-        <p:nvPicPr>
-          <p:cNvPr id="5" name="Content Placeholder 4">
+      <p:graphicFrame>
+        <p:nvGraphicFramePr>
+          <p:cNvPr id="5" name="Content Placeholder 2">
             <a:extLst>
               <a:ext uri="{FF2B5EF4-FFF2-40B4-BE49-F238E27FC236}">
-                <a16:creationId xmlns:a16="http://schemas.microsoft.com/office/drawing/2014/main" id="{3C8D9992-AF44-7B16-239E-B4FE0C0FE268}"/>
+                <a16:creationId xmlns:a16="http://schemas.microsoft.com/office/drawing/2014/main" id="{845B2137-069F-18DB-489A-2A7DBF88626C}"/>
               </a:ext>
             </a:extLst>
           </p:cNvPr>
-          <p:cNvPicPr>
-            <a:picLocks noGrp="1" noChangeAspect="1"/>
-          </p:cNvPicPr>
+          <p:cNvGraphicFramePr>
+            <a:graphicFrameLocks noGrp="1"/>
+          </p:cNvGraphicFramePr>
           <p:nvPr>
             <p:ph idx="1"/>
           </p:nvPr>
-        </p:nvPicPr>
-        <p:blipFill>
-          <a:blip r:embed="rId2"/>
-          <a:stretch>
-            <a:fillRect/>
-          </a:stretch>
-        </p:blipFill>
-        <p:spPr>
-          <a:xfrm>
-            <a:off x="211476" y="1816099"/>
-            <a:ext cx="5100264" cy="4406351"/>
-          </a:xfrm>
-        </p:spPr>
-      </p:pic>
-      <p:pic>
-        <p:nvPicPr>
-          <p:cNvPr id="7" name="Picture 6">
-            <a:extLst>
-              <a:ext uri="{FF2B5EF4-FFF2-40B4-BE49-F238E27FC236}">
-                <a16:creationId xmlns:a16="http://schemas.microsoft.com/office/drawing/2014/main" id="{8165B7B3-35AB-3F81-079A-78557285B5FE}"/>
-              </a:ext>
-            </a:extLst>
-          </p:cNvPr>
-          <p:cNvPicPr>
-            <a:picLocks noChangeAspect="1"/>
-          </p:cNvPicPr>
-          <p:nvPr/>
-        </p:nvPicPr>
-        <p:blipFill>
-          <a:blip r:embed="rId3"/>
-          <a:stretch>
-            <a:fillRect/>
-          </a:stretch>
-        </p:blipFill>
-        <p:spPr>
-          <a:xfrm>
-            <a:off x="5703798" y="1816099"/>
-            <a:ext cx="5951567" cy="4265571"/>
-          </a:xfrm>
-          <a:prstGeom prst="rect">
-            <a:avLst/>
-          </a:prstGeom>
-        </p:spPr>
-      </p:pic>
+        </p:nvGraphicFramePr>
+        <p:xfrm>
+          <a:off x="838200" y="1825625"/>
+          <a:ext cx="10515600" cy="4351338"/>
+        </p:xfrm>
+        <a:graphic>
+          <a:graphicData uri="http://schemas.openxmlformats.org/drawingml/2006/diagram">
+            <dgm:relIds xmlns:dgm="http://schemas.openxmlformats.org/drawingml/2006/diagram" xmlns:r="http://schemas.openxmlformats.org/officeDocument/2006/relationships" r:dm="rId2" r:lo="rId3" r:qs="rId4" r:cs="rId5"/>
+          </a:graphicData>
+        </a:graphic>
+      </p:graphicFrame>
     </p:spTree>
     <p:extLst>
       <p:ext uri="{BB962C8B-B14F-4D97-AF65-F5344CB8AC3E}">
-        <p14:creationId xmlns:p14="http://schemas.microsoft.com/office/powerpoint/2010/main" val="644456317"/>
+        <p14:creationId xmlns:p14="http://schemas.microsoft.com/office/powerpoint/2010/main" val="489146656"/>
       </p:ext>
     </p:extLst>
   </p:cSld>
@@ -18712,7 +19779,359 @@
 </p:sld>
 </file>
 
+<file path=ppt/slides/slide12.xml><?xml version="1.0" encoding="utf-8"?>
+<p:sld xmlns:a="http://schemas.openxmlformats.org/drawingml/2006/main" xmlns:r="http://schemas.openxmlformats.org/officeDocument/2006/relationships" xmlns:p="http://schemas.openxmlformats.org/presentationml/2006/main">
+  <p:cSld>
+    <p:spTree>
+      <p:nvGrpSpPr>
+        <p:cNvPr id="1" name="Shape 53"/>
+        <p:cNvGrpSpPr/>
+        <p:nvPr/>
+      </p:nvGrpSpPr>
+      <p:grpSpPr>
+        <a:xfrm>
+          <a:off x="0" y="0"/>
+          <a:ext cx="0" cy="0"/>
+          <a:chOff x="0" y="0"/>
+          <a:chExt cx="0" cy="0"/>
+        </a:xfrm>
+      </p:grpSpPr>
+      <p:sp>
+        <p:nvSpPr>
+          <p:cNvPr id="54" name="Google Shape;54;p13"/>
+          <p:cNvSpPr txBox="1">
+            <a:spLocks noGrp="1"/>
+          </p:cNvSpPr>
+          <p:nvPr>
+            <p:ph type="ctrTitle"/>
+          </p:nvPr>
+        </p:nvSpPr>
+        <p:spPr>
+          <a:xfrm>
+            <a:off x="415600" y="136067"/>
+            <a:ext cx="11360800" cy="707600"/>
+          </a:xfrm>
+          <a:prstGeom prst="rect">
+            <a:avLst/>
+          </a:prstGeom>
+        </p:spPr>
+        <p:txBody>
+          <a:bodyPr spcFirstLastPara="1" vert="horz" wrap="square" lIns="121900" tIns="121900" rIns="121900" bIns="121900" rtlCol="0" anchor="b" anchorCtr="0">
+            <a:noAutofit/>
+          </a:bodyPr>
+          <a:lstStyle/>
+          <a:p>
+            <a:pPr>
+              <a:spcBef>
+                <a:spcPts val="0"/>
+              </a:spcBef>
+              <a:buSzPts val="990"/>
+            </a:pPr>
+            <a:r>
+              <a:rPr lang="en-GB" sz="4240"/>
+              <a:t>Feature Importance for Decision Trees</a:t>
+            </a:r>
+            <a:endParaRPr sz="4240"/>
+          </a:p>
+        </p:txBody>
+      </p:sp>
+      <p:pic>
+        <p:nvPicPr>
+          <p:cNvPr id="55" name="Google Shape;55;p13"/>
+          <p:cNvPicPr preferRelativeResize="0"/>
+          <p:nvPr/>
+        </p:nvPicPr>
+        <p:blipFill>
+          <a:blip r:embed="rId3">
+            <a:alphaModFix/>
+          </a:blip>
+          <a:stretch>
+            <a:fillRect/>
+          </a:stretch>
+        </p:blipFill>
+        <p:spPr>
+          <a:xfrm>
+            <a:off x="203201" y="1550334"/>
+            <a:ext cx="11893569" cy="4504833"/>
+          </a:xfrm>
+          <a:prstGeom prst="rect">
+            <a:avLst/>
+          </a:prstGeom>
+          <a:noFill/>
+          <a:ln>
+            <a:noFill/>
+          </a:ln>
+        </p:spPr>
+      </p:pic>
+    </p:spTree>
+  </p:cSld>
+  <p:clrMapOvr>
+    <a:masterClrMapping/>
+  </p:clrMapOvr>
+</p:sld>
+</file>
+
+<file path=ppt/slides/slide13.xml><?xml version="1.0" encoding="utf-8"?>
+<p:sld xmlns:a="http://schemas.openxmlformats.org/drawingml/2006/main" xmlns:r="http://schemas.openxmlformats.org/officeDocument/2006/relationships" xmlns:p="http://schemas.openxmlformats.org/presentationml/2006/main">
+  <p:cSld>
+    <p:spTree>
+      <p:nvGrpSpPr>
+        <p:cNvPr id="1" name="Shape 59"/>
+        <p:cNvGrpSpPr/>
+        <p:nvPr/>
+      </p:nvGrpSpPr>
+      <p:grpSpPr>
+        <a:xfrm>
+          <a:off x="0" y="0"/>
+          <a:ext cx="0" cy="0"/>
+          <a:chOff x="0" y="0"/>
+          <a:chExt cx="0" cy="0"/>
+        </a:xfrm>
+      </p:grpSpPr>
+      <p:sp>
+        <p:nvSpPr>
+          <p:cNvPr id="60" name="Google Shape;60;p14"/>
+          <p:cNvSpPr txBox="1">
+            <a:spLocks noGrp="1"/>
+          </p:cNvSpPr>
+          <p:nvPr>
+            <p:ph type="title"/>
+          </p:nvPr>
+        </p:nvSpPr>
+        <p:spPr>
+          <a:xfrm>
+            <a:off x="415600" y="593367"/>
+            <a:ext cx="11360800" cy="763600"/>
+          </a:xfrm>
+          <a:prstGeom prst="rect">
+            <a:avLst/>
+          </a:prstGeom>
+        </p:spPr>
+        <p:txBody>
+          <a:bodyPr spcFirstLastPara="1" vert="horz" wrap="square" lIns="121900" tIns="121900" rIns="121900" bIns="121900" rtlCol="0" anchor="t" anchorCtr="0">
+            <a:normAutofit fontScale="90000"/>
+          </a:bodyPr>
+          <a:lstStyle/>
+          <a:p>
+            <a:r>
+              <a:rPr lang="en-GB"/>
+              <a:t>               ROC-AUC Curve for Decision Trees</a:t>
+            </a:r>
+            <a:endParaRPr/>
+          </a:p>
+        </p:txBody>
+      </p:sp>
+      <p:pic>
+        <p:nvPicPr>
+          <p:cNvPr id="61" name="Google Shape;61;p14"/>
+          <p:cNvPicPr preferRelativeResize="0"/>
+          <p:nvPr/>
+        </p:nvPicPr>
+        <p:blipFill>
+          <a:blip r:embed="rId3">
+            <a:alphaModFix/>
+          </a:blip>
+          <a:stretch>
+            <a:fillRect/>
+          </a:stretch>
+        </p:blipFill>
+        <p:spPr>
+          <a:xfrm>
+            <a:off x="203201" y="1560168"/>
+            <a:ext cx="11036300" cy="5094633"/>
+          </a:xfrm>
+          <a:prstGeom prst="rect">
+            <a:avLst/>
+          </a:prstGeom>
+          <a:noFill/>
+          <a:ln>
+            <a:noFill/>
+          </a:ln>
+        </p:spPr>
+      </p:pic>
+    </p:spTree>
+  </p:cSld>
+  <p:clrMapOvr>
+    <a:masterClrMapping/>
+  </p:clrMapOvr>
+</p:sld>
+</file>
+
 <file path=ppt/slides/slide14.xml><?xml version="1.0" encoding="utf-8"?>
+<p:sld xmlns:a="http://schemas.openxmlformats.org/drawingml/2006/main" xmlns:r="http://schemas.openxmlformats.org/officeDocument/2006/relationships" xmlns:p="http://schemas.openxmlformats.org/presentationml/2006/main">
+  <p:cSld>
+    <p:spTree>
+      <p:nvGrpSpPr>
+        <p:cNvPr id="1" name="Shape 65"/>
+        <p:cNvGrpSpPr/>
+        <p:nvPr/>
+      </p:nvGrpSpPr>
+      <p:grpSpPr>
+        <a:xfrm>
+          <a:off x="0" y="0"/>
+          <a:ext cx="0" cy="0"/>
+          <a:chOff x="0" y="0"/>
+          <a:chExt cx="0" cy="0"/>
+        </a:xfrm>
+      </p:grpSpPr>
+      <p:sp>
+        <p:nvSpPr>
+          <p:cNvPr id="66" name="Google Shape;66;p15"/>
+          <p:cNvSpPr txBox="1">
+            <a:spLocks noGrp="1"/>
+          </p:cNvSpPr>
+          <p:nvPr>
+            <p:ph type="title"/>
+          </p:nvPr>
+        </p:nvSpPr>
+        <p:spPr>
+          <a:xfrm>
+            <a:off x="415600" y="593367"/>
+            <a:ext cx="11360800" cy="763600"/>
+          </a:xfrm>
+          <a:prstGeom prst="rect">
+            <a:avLst/>
+          </a:prstGeom>
+        </p:spPr>
+        <p:txBody>
+          <a:bodyPr spcFirstLastPara="1" vert="horz" wrap="square" lIns="121900" tIns="121900" rIns="121900" bIns="121900" rtlCol="0" anchor="t" anchorCtr="0">
+            <a:normAutofit fontScale="90000"/>
+          </a:bodyPr>
+          <a:lstStyle/>
+          <a:p>
+            <a:pPr marL="1219170" indent="609585"/>
+            <a:r>
+              <a:rPr lang="en-GB"/>
+              <a:t>Confusion Matrix for Decision Trees</a:t>
+            </a:r>
+            <a:endParaRPr/>
+          </a:p>
+        </p:txBody>
+      </p:sp>
+      <p:pic>
+        <p:nvPicPr>
+          <p:cNvPr id="67" name="Google Shape;67;p15"/>
+          <p:cNvPicPr preferRelativeResize="0"/>
+          <p:nvPr/>
+        </p:nvPicPr>
+        <p:blipFill>
+          <a:blip r:embed="rId3">
+            <a:alphaModFix/>
+          </a:blip>
+          <a:stretch>
+            <a:fillRect/>
+          </a:stretch>
+        </p:blipFill>
+        <p:spPr>
+          <a:xfrm>
+            <a:off x="2407567" y="1614568"/>
+            <a:ext cx="6513236" cy="5094633"/>
+          </a:xfrm>
+          <a:prstGeom prst="rect">
+            <a:avLst/>
+          </a:prstGeom>
+          <a:noFill/>
+          <a:ln>
+            <a:noFill/>
+          </a:ln>
+        </p:spPr>
+      </p:pic>
+    </p:spTree>
+  </p:cSld>
+  <p:clrMapOvr>
+    <a:masterClrMapping/>
+  </p:clrMapOvr>
+</p:sld>
+</file>
+
+<file path=ppt/slides/slide15.xml><?xml version="1.0" encoding="utf-8"?>
+<p:sld xmlns:a="http://schemas.openxmlformats.org/drawingml/2006/main" xmlns:r="http://schemas.openxmlformats.org/officeDocument/2006/relationships" xmlns:p="http://schemas.openxmlformats.org/presentationml/2006/main">
+  <p:cSld>
+    <p:spTree>
+      <p:nvGrpSpPr>
+        <p:cNvPr id="1" name="Shape 71"/>
+        <p:cNvGrpSpPr/>
+        <p:nvPr/>
+      </p:nvGrpSpPr>
+      <p:grpSpPr>
+        <a:xfrm>
+          <a:off x="0" y="0"/>
+          <a:ext cx="0" cy="0"/>
+          <a:chOff x="0" y="0"/>
+          <a:chExt cx="0" cy="0"/>
+        </a:xfrm>
+      </p:grpSpPr>
+      <p:sp>
+        <p:nvSpPr>
+          <p:cNvPr id="72" name="Google Shape;72;p16"/>
+          <p:cNvSpPr txBox="1">
+            <a:spLocks noGrp="1"/>
+          </p:cNvSpPr>
+          <p:nvPr>
+            <p:ph type="title"/>
+          </p:nvPr>
+        </p:nvSpPr>
+        <p:spPr>
+          <a:xfrm>
+            <a:off x="415600" y="593367"/>
+            <a:ext cx="11360800" cy="763600"/>
+          </a:xfrm>
+          <a:prstGeom prst="rect">
+            <a:avLst/>
+          </a:prstGeom>
+        </p:spPr>
+        <p:txBody>
+          <a:bodyPr spcFirstLastPara="1" vert="horz" wrap="square" lIns="121900" tIns="121900" rIns="121900" bIns="121900" rtlCol="0" anchor="t" anchorCtr="0">
+            <a:normAutofit fontScale="90000"/>
+          </a:bodyPr>
+          <a:lstStyle/>
+          <a:p>
+            <a:pPr marL="2438339" indent="609585"/>
+            <a:r>
+              <a:rPr lang="en-GB"/>
+              <a:t>The Decision Tree</a:t>
+            </a:r>
+            <a:endParaRPr/>
+          </a:p>
+        </p:txBody>
+      </p:sp>
+      <p:pic>
+        <p:nvPicPr>
+          <p:cNvPr id="73" name="Google Shape;73;p16"/>
+          <p:cNvPicPr preferRelativeResize="0"/>
+          <p:nvPr/>
+        </p:nvPicPr>
+        <p:blipFill>
+          <a:blip r:embed="rId3">
+            <a:alphaModFix/>
+          </a:blip>
+          <a:stretch>
+            <a:fillRect/>
+          </a:stretch>
+        </p:blipFill>
+        <p:spPr>
+          <a:xfrm>
+            <a:off x="203201" y="1560167"/>
+            <a:ext cx="11920767" cy="5216200"/>
+          </a:xfrm>
+          <a:prstGeom prst="rect">
+            <a:avLst/>
+          </a:prstGeom>
+          <a:noFill/>
+          <a:ln>
+            <a:noFill/>
+          </a:ln>
+        </p:spPr>
+      </p:pic>
+    </p:spTree>
+  </p:cSld>
+  <p:clrMapOvr>
+    <a:masterClrMapping/>
+  </p:clrMapOvr>
+</p:sld>
+</file>
+
+<file path=ppt/slides/slide16.xml><?xml version="1.0" encoding="utf-8"?>
 <p:sld xmlns:a="http://schemas.openxmlformats.org/drawingml/2006/main" xmlns:r="http://schemas.openxmlformats.org/officeDocument/2006/relationships" xmlns:p="http://schemas.openxmlformats.org/presentationml/2006/main">
   <p:cSld>
     <p:spTree>
@@ -18799,7 +20218,110 @@
 </p:sld>
 </file>
 
-<file path=ppt/slides/slide15.xml><?xml version="1.0" encoding="utf-8"?>
+<file path=ppt/slides/slide17.xml><?xml version="1.0" encoding="utf-8"?>
+<p:sld xmlns:a="http://schemas.openxmlformats.org/drawingml/2006/main" xmlns:r="http://schemas.openxmlformats.org/officeDocument/2006/relationships" xmlns:p="http://schemas.openxmlformats.org/presentationml/2006/main">
+  <p:cSld>
+    <p:spTree>
+      <p:nvGrpSpPr>
+        <p:cNvPr id="1" name="Shape 53"/>
+        <p:cNvGrpSpPr/>
+        <p:nvPr/>
+      </p:nvGrpSpPr>
+      <p:grpSpPr>
+        <a:xfrm>
+          <a:off x="0" y="0"/>
+          <a:ext cx="0" cy="0"/>
+          <a:chOff x="0" y="0"/>
+          <a:chExt cx="0" cy="0"/>
+        </a:xfrm>
+      </p:grpSpPr>
+      <p:sp>
+        <p:nvSpPr>
+          <p:cNvPr id="54" name="Google Shape;54;p13"/>
+          <p:cNvSpPr txBox="1">
+            <a:spLocks noGrp="1"/>
+          </p:cNvSpPr>
+          <p:nvPr>
+            <p:ph type="ctrTitle"/>
+          </p:nvPr>
+        </p:nvSpPr>
+        <p:spPr>
+          <a:xfrm>
+            <a:off x="415600" y="136067"/>
+            <a:ext cx="11360800" cy="707600"/>
+          </a:xfrm>
+          <a:prstGeom prst="rect">
+            <a:avLst/>
+          </a:prstGeom>
+        </p:spPr>
+        <p:txBody>
+          <a:bodyPr spcFirstLastPara="1" vert="horz" wrap="square" lIns="121900" tIns="121900" rIns="121900" bIns="121900" rtlCol="0" anchor="b" anchorCtr="0">
+            <a:noAutofit/>
+          </a:bodyPr>
+          <a:lstStyle/>
+          <a:p>
+            <a:pPr>
+              <a:spcBef>
+                <a:spcPts val="0"/>
+              </a:spcBef>
+              <a:buSzPts val="990"/>
+            </a:pPr>
+            <a:r>
+              <a:rPr lang="en-GB" sz="4240" dirty="0"/>
+              <a:t>Feature Importance for Random </a:t>
+            </a:r>
+            <a:r>
+              <a:rPr lang="en-GB" sz="4240" dirty="0" err="1"/>
+              <a:t>Frest</a:t>
+            </a:r>
+            <a:endParaRPr sz="4240" dirty="0"/>
+          </a:p>
+        </p:txBody>
+      </p:sp>
+      <p:pic>
+        <p:nvPicPr>
+          <p:cNvPr id="3" name="Picture 2">
+            <a:extLst>
+              <a:ext uri="{FF2B5EF4-FFF2-40B4-BE49-F238E27FC236}">
+                <a16:creationId xmlns:a16="http://schemas.microsoft.com/office/drawing/2014/main" id="{27F4E18F-DC0F-E42A-8BD5-07C6371DB21A}"/>
+              </a:ext>
+            </a:extLst>
+          </p:cNvPr>
+          <p:cNvPicPr>
+            <a:picLocks noChangeAspect="1"/>
+          </p:cNvPicPr>
+          <p:nvPr/>
+        </p:nvPicPr>
+        <p:blipFill>
+          <a:blip r:embed="rId3"/>
+          <a:stretch>
+            <a:fillRect/>
+          </a:stretch>
+        </p:blipFill>
+        <p:spPr>
+          <a:xfrm>
+            <a:off x="3060700" y="1206500"/>
+            <a:ext cx="6070600" cy="4445000"/>
+          </a:xfrm>
+          <a:prstGeom prst="rect">
+            <a:avLst/>
+          </a:prstGeom>
+        </p:spPr>
+      </p:pic>
+    </p:spTree>
+    <p:extLst>
+      <p:ext uri="{BB962C8B-B14F-4D97-AF65-F5344CB8AC3E}">
+        <p14:creationId xmlns:p14="http://schemas.microsoft.com/office/powerpoint/2010/main" val="849635846"/>
+      </p:ext>
+    </p:extLst>
+  </p:cSld>
+  <p:clrMapOvr>
+    <a:masterClrMapping/>
+  </p:clrMapOvr>
+</p:sld>
+</file>
+
+<file path=ppt/slides/slide18.xml><?xml version="1.0" encoding="utf-8"?>
 <p:sld xmlns:a="http://schemas.openxmlformats.org/drawingml/2006/main" xmlns:r="http://schemas.openxmlformats.org/officeDocument/2006/relationships" xmlns:p="http://schemas.openxmlformats.org/presentationml/2006/main">
   <p:cSld>
     <p:spTree>
@@ -18922,7 +20444,727 @@
 </p:sld>
 </file>
 
+<file path=ppt/slides/slide19.xml><?xml version="1.0" encoding="utf-8"?>
+<p:sld xmlns:a="http://schemas.openxmlformats.org/drawingml/2006/main" xmlns:r="http://schemas.openxmlformats.org/officeDocument/2006/relationships" xmlns:p="http://schemas.openxmlformats.org/presentationml/2006/main">
+  <p:cSld>
+    <p:spTree>
+      <p:nvGrpSpPr>
+        <p:cNvPr id="1" name=""/>
+        <p:cNvGrpSpPr/>
+        <p:nvPr/>
+      </p:nvGrpSpPr>
+      <p:grpSpPr>
+        <a:xfrm>
+          <a:off x="0" y="0"/>
+          <a:ext cx="0" cy="0"/>
+          <a:chOff x="0" y="0"/>
+          <a:chExt cx="0" cy="0"/>
+        </a:xfrm>
+      </p:grpSpPr>
+      <p:sp>
+        <p:nvSpPr>
+          <p:cNvPr id="2" name="Title 1">
+            <a:extLst>
+              <a:ext uri="{FF2B5EF4-FFF2-40B4-BE49-F238E27FC236}">
+                <a16:creationId xmlns:a16="http://schemas.microsoft.com/office/drawing/2014/main" id="{818512EA-7D4E-B7E4-7D3D-B0C943C6755F}"/>
+              </a:ext>
+            </a:extLst>
+          </p:cNvPr>
+          <p:cNvSpPr>
+            <a:spLocks noGrp="1"/>
+          </p:cNvSpPr>
+          <p:nvPr>
+            <p:ph type="title"/>
+          </p:nvPr>
+        </p:nvSpPr>
+        <p:spPr/>
+        <p:txBody>
+          <a:bodyPr/>
+          <a:lstStyle/>
+          <a:p>
+            <a:r>
+              <a:rPr lang="en-US" dirty="0"/>
+              <a:t>Gradient Boosting Results</a:t>
+            </a:r>
+          </a:p>
+        </p:txBody>
+      </p:sp>
+      <p:pic>
+        <p:nvPicPr>
+          <p:cNvPr id="5" name="Content Placeholder 4">
+            <a:extLst>
+              <a:ext uri="{FF2B5EF4-FFF2-40B4-BE49-F238E27FC236}">
+                <a16:creationId xmlns:a16="http://schemas.microsoft.com/office/drawing/2014/main" id="{88E484E5-F897-A1BC-A2C9-231252585664}"/>
+              </a:ext>
+            </a:extLst>
+          </p:cNvPr>
+          <p:cNvPicPr>
+            <a:picLocks noGrp="1" noChangeAspect="1"/>
+          </p:cNvPicPr>
+          <p:nvPr>
+            <p:ph idx="1"/>
+          </p:nvPr>
+        </p:nvPicPr>
+        <p:blipFill>
+          <a:blip r:embed="rId2"/>
+          <a:stretch>
+            <a:fillRect/>
+          </a:stretch>
+        </p:blipFill>
+        <p:spPr>
+          <a:xfrm>
+            <a:off x="838199" y="1690687"/>
+            <a:ext cx="10406301" cy="4514903"/>
+          </a:xfrm>
+        </p:spPr>
+      </p:pic>
+    </p:spTree>
+    <p:extLst>
+      <p:ext uri="{BB962C8B-B14F-4D97-AF65-F5344CB8AC3E}">
+        <p14:creationId xmlns:p14="http://schemas.microsoft.com/office/powerpoint/2010/main" val="35805409"/>
+      </p:ext>
+    </p:extLst>
+  </p:cSld>
+  <p:clrMapOvr>
+    <a:masterClrMapping/>
+  </p:clrMapOvr>
+</p:sld>
+</file>
+
 <file path=ppt/slides/slide2.xml><?xml version="1.0" encoding="utf-8"?>
+<p:sld xmlns:a="http://schemas.openxmlformats.org/drawingml/2006/main" xmlns:r="http://schemas.openxmlformats.org/officeDocument/2006/relationships" xmlns:p="http://schemas.openxmlformats.org/presentationml/2006/main">
+  <p:cSld>
+    <p:spTree>
+      <p:nvGrpSpPr>
+        <p:cNvPr id="1" name=""/>
+        <p:cNvGrpSpPr/>
+        <p:nvPr/>
+      </p:nvGrpSpPr>
+      <p:grpSpPr>
+        <a:xfrm>
+          <a:off x="0" y="0"/>
+          <a:ext cx="0" cy="0"/>
+          <a:chOff x="0" y="0"/>
+          <a:chExt cx="0" cy="0"/>
+        </a:xfrm>
+      </p:grpSpPr>
+      <p:sp>
+        <p:nvSpPr>
+          <p:cNvPr id="2" name="Title 1">
+            <a:extLst>
+              <a:ext uri="{FF2B5EF4-FFF2-40B4-BE49-F238E27FC236}">
+                <a16:creationId xmlns:a16="http://schemas.microsoft.com/office/drawing/2014/main" id="{4C348C68-F592-61EC-A858-57EEB7374F4F}"/>
+              </a:ext>
+            </a:extLst>
+          </p:cNvPr>
+          <p:cNvSpPr>
+            <a:spLocks noGrp="1"/>
+          </p:cNvSpPr>
+          <p:nvPr>
+            <p:ph type="title"/>
+          </p:nvPr>
+        </p:nvSpPr>
+        <p:spPr>
+          <a:xfrm>
+            <a:off x="1043631" y="809898"/>
+            <a:ext cx="10173010" cy="1554480"/>
+          </a:xfrm>
+        </p:spPr>
+        <p:txBody>
+          <a:bodyPr anchor="ctr">
+            <a:normAutofit/>
+          </a:bodyPr>
+          <a:lstStyle/>
+          <a:p>
+            <a:r>
+              <a:rPr lang="en-IN" sz="4800"/>
+              <a:t>Points</a:t>
+            </a:r>
+          </a:p>
+        </p:txBody>
+      </p:sp>
+      <p:graphicFrame>
+        <p:nvGraphicFramePr>
+          <p:cNvPr id="5" name="Content Placeholder 2">
+            <a:extLst>
+              <a:ext uri="{FF2B5EF4-FFF2-40B4-BE49-F238E27FC236}">
+                <a16:creationId xmlns:a16="http://schemas.microsoft.com/office/drawing/2014/main" id="{EE07704A-5F3D-5A66-19A0-1F71292E6618}"/>
+              </a:ext>
+            </a:extLst>
+          </p:cNvPr>
+          <p:cNvGraphicFramePr>
+            <a:graphicFrameLocks noGrp="1"/>
+          </p:cNvGraphicFramePr>
+          <p:nvPr>
+            <p:ph idx="1"/>
+          </p:nvPr>
+        </p:nvGraphicFramePr>
+        <p:xfrm>
+          <a:off x="904602" y="3017519"/>
+          <a:ext cx="10378440" cy="3209902"/>
+        </p:xfrm>
+        <a:graphic>
+          <a:graphicData uri="http://schemas.openxmlformats.org/drawingml/2006/diagram">
+            <dgm:relIds xmlns:dgm="http://schemas.openxmlformats.org/drawingml/2006/diagram" xmlns:r="http://schemas.openxmlformats.org/officeDocument/2006/relationships" r:dm="rId2" r:lo="rId3" r:qs="rId4" r:cs="rId5"/>
+          </a:graphicData>
+        </a:graphic>
+      </p:graphicFrame>
+    </p:spTree>
+    <p:extLst>
+      <p:ext uri="{BB962C8B-B14F-4D97-AF65-F5344CB8AC3E}">
+        <p14:creationId xmlns:p14="http://schemas.microsoft.com/office/powerpoint/2010/main" val="597579998"/>
+      </p:ext>
+    </p:extLst>
+  </p:cSld>
+  <p:clrMapOvr>
+    <a:masterClrMapping/>
+  </p:clrMapOvr>
+</p:sld>
+</file>
+
+<file path=ppt/slides/slide20.xml><?xml version="1.0" encoding="utf-8"?>
+<p:sld xmlns:a="http://schemas.openxmlformats.org/drawingml/2006/main" xmlns:r="http://schemas.openxmlformats.org/officeDocument/2006/relationships" xmlns:p="http://schemas.openxmlformats.org/presentationml/2006/main">
+  <p:cSld>
+    <p:spTree>
+      <p:nvGrpSpPr>
+        <p:cNvPr id="1" name=""/>
+        <p:cNvGrpSpPr/>
+        <p:nvPr/>
+      </p:nvGrpSpPr>
+      <p:grpSpPr>
+        <a:xfrm>
+          <a:off x="0" y="0"/>
+          <a:ext cx="0" cy="0"/>
+          <a:chOff x="0" y="0"/>
+          <a:chExt cx="0" cy="0"/>
+        </a:xfrm>
+      </p:grpSpPr>
+      <p:sp>
+        <p:nvSpPr>
+          <p:cNvPr id="2" name="Title 1">
+            <a:extLst>
+              <a:ext uri="{FF2B5EF4-FFF2-40B4-BE49-F238E27FC236}">
+                <a16:creationId xmlns:a16="http://schemas.microsoft.com/office/drawing/2014/main" id="{CCC8767D-8FC8-C056-FEF9-5F5C88B73D35}"/>
+              </a:ext>
+            </a:extLst>
+          </p:cNvPr>
+          <p:cNvSpPr>
+            <a:spLocks noGrp="1"/>
+          </p:cNvSpPr>
+          <p:nvPr>
+            <p:ph type="title"/>
+          </p:nvPr>
+        </p:nvSpPr>
+        <p:spPr/>
+        <p:txBody>
+          <a:bodyPr/>
+          <a:lstStyle/>
+          <a:p>
+            <a:r>
+              <a:rPr lang="en-US" dirty="0"/>
+              <a:t>Performance – GBC on sample weights</a:t>
+            </a:r>
+          </a:p>
+        </p:txBody>
+      </p:sp>
+      <p:pic>
+        <p:nvPicPr>
+          <p:cNvPr id="5" name="Content Placeholder 4">
+            <a:extLst>
+              <a:ext uri="{FF2B5EF4-FFF2-40B4-BE49-F238E27FC236}">
+                <a16:creationId xmlns:a16="http://schemas.microsoft.com/office/drawing/2014/main" id="{3C8D9992-AF44-7B16-239E-B4FE0C0FE268}"/>
+              </a:ext>
+            </a:extLst>
+          </p:cNvPr>
+          <p:cNvPicPr>
+            <a:picLocks noGrp="1" noChangeAspect="1"/>
+          </p:cNvPicPr>
+          <p:nvPr>
+            <p:ph idx="1"/>
+          </p:nvPr>
+        </p:nvPicPr>
+        <p:blipFill>
+          <a:blip r:embed="rId2"/>
+          <a:stretch>
+            <a:fillRect/>
+          </a:stretch>
+        </p:blipFill>
+        <p:spPr>
+          <a:xfrm>
+            <a:off x="211476" y="1816099"/>
+            <a:ext cx="5100264" cy="4406351"/>
+          </a:xfrm>
+        </p:spPr>
+      </p:pic>
+      <p:pic>
+        <p:nvPicPr>
+          <p:cNvPr id="7" name="Picture 6">
+            <a:extLst>
+              <a:ext uri="{FF2B5EF4-FFF2-40B4-BE49-F238E27FC236}">
+                <a16:creationId xmlns:a16="http://schemas.microsoft.com/office/drawing/2014/main" id="{8165B7B3-35AB-3F81-079A-78557285B5FE}"/>
+              </a:ext>
+            </a:extLst>
+          </p:cNvPr>
+          <p:cNvPicPr>
+            <a:picLocks noChangeAspect="1"/>
+          </p:cNvPicPr>
+          <p:nvPr/>
+        </p:nvPicPr>
+        <p:blipFill>
+          <a:blip r:embed="rId3"/>
+          <a:stretch>
+            <a:fillRect/>
+          </a:stretch>
+        </p:blipFill>
+        <p:spPr>
+          <a:xfrm>
+            <a:off x="5703798" y="1816099"/>
+            <a:ext cx="5951567" cy="4265571"/>
+          </a:xfrm>
+          <a:prstGeom prst="rect">
+            <a:avLst/>
+          </a:prstGeom>
+        </p:spPr>
+      </p:pic>
+      <p:sp>
+        <p:nvSpPr>
+          <p:cNvPr id="3" name="TextBox 2">
+            <a:extLst>
+              <a:ext uri="{FF2B5EF4-FFF2-40B4-BE49-F238E27FC236}">
+                <a16:creationId xmlns:a16="http://schemas.microsoft.com/office/drawing/2014/main" id="{9BEBA3B4-D728-BEE6-B7D9-57A7024DDBB0}"/>
+              </a:ext>
+            </a:extLst>
+          </p:cNvPr>
+          <p:cNvSpPr txBox="1"/>
+          <p:nvPr/>
+        </p:nvSpPr>
+        <p:spPr>
+          <a:xfrm>
+            <a:off x="1257299" y="2800350"/>
+            <a:ext cx="979714" cy="369332"/>
+          </a:xfrm>
+          <a:prstGeom prst="rect">
+            <a:avLst/>
+          </a:prstGeom>
+          <a:noFill/>
+        </p:spPr>
+        <p:txBody>
+          <a:bodyPr wrap="square" rtlCol="0">
+            <a:spAutoFit/>
+          </a:bodyPr>
+          <a:lstStyle/>
+          <a:p>
+            <a:r>
+              <a:rPr lang="en-US" dirty="0"/>
+              <a:t>4098</a:t>
+            </a:r>
+          </a:p>
+        </p:txBody>
+      </p:sp>
+      <p:sp>
+        <p:nvSpPr>
+          <p:cNvPr id="4" name="TextBox 3">
+            <a:extLst>
+              <a:ext uri="{FF2B5EF4-FFF2-40B4-BE49-F238E27FC236}">
+                <a16:creationId xmlns:a16="http://schemas.microsoft.com/office/drawing/2014/main" id="{4921DE5A-4CAC-790A-09E3-10D39E34F7EB}"/>
+              </a:ext>
+            </a:extLst>
+          </p:cNvPr>
+          <p:cNvSpPr txBox="1"/>
+          <p:nvPr/>
+        </p:nvSpPr>
+        <p:spPr>
+          <a:xfrm>
+            <a:off x="2898320" y="2800350"/>
+            <a:ext cx="979714" cy="369332"/>
+          </a:xfrm>
+          <a:prstGeom prst="rect">
+            <a:avLst/>
+          </a:prstGeom>
+          <a:noFill/>
+        </p:spPr>
+        <p:txBody>
+          <a:bodyPr wrap="square" rtlCol="0">
+            <a:spAutoFit/>
+          </a:bodyPr>
+          <a:lstStyle/>
+          <a:p>
+            <a:r>
+              <a:rPr lang="en-US" dirty="0"/>
+              <a:t>2749</a:t>
+            </a:r>
+          </a:p>
+        </p:txBody>
+      </p:sp>
+      <p:sp>
+        <p:nvSpPr>
+          <p:cNvPr id="8" name="TextBox 7">
+            <a:extLst>
+              <a:ext uri="{FF2B5EF4-FFF2-40B4-BE49-F238E27FC236}">
+                <a16:creationId xmlns:a16="http://schemas.microsoft.com/office/drawing/2014/main" id="{F72859A4-DF5C-2629-84DA-A4276F7C03D9}"/>
+              </a:ext>
+            </a:extLst>
+          </p:cNvPr>
+          <p:cNvSpPr txBox="1"/>
+          <p:nvPr/>
+        </p:nvSpPr>
+        <p:spPr>
+          <a:xfrm>
+            <a:off x="1257299" y="4629150"/>
+            <a:ext cx="979714" cy="646331"/>
+          </a:xfrm>
+          <a:prstGeom prst="rect">
+            <a:avLst/>
+          </a:prstGeom>
+          <a:noFill/>
+        </p:spPr>
+        <p:txBody>
+          <a:bodyPr wrap="square" rtlCol="0">
+            <a:spAutoFit/>
+          </a:bodyPr>
+          <a:lstStyle/>
+          <a:p>
+            <a:r>
+              <a:rPr lang="en-US" dirty="0"/>
+              <a:t>240	</a:t>
+            </a:r>
+          </a:p>
+        </p:txBody>
+      </p:sp>
+      <p:sp>
+        <p:nvSpPr>
+          <p:cNvPr id="9" name="TextBox 8">
+            <a:extLst>
+              <a:ext uri="{FF2B5EF4-FFF2-40B4-BE49-F238E27FC236}">
+                <a16:creationId xmlns:a16="http://schemas.microsoft.com/office/drawing/2014/main" id="{960BBD3C-E710-3C7B-D648-ECA432E97A63}"/>
+              </a:ext>
+            </a:extLst>
+          </p:cNvPr>
+          <p:cNvSpPr txBox="1"/>
+          <p:nvPr/>
+        </p:nvSpPr>
+        <p:spPr>
+          <a:xfrm>
+            <a:off x="2898320" y="4607476"/>
+            <a:ext cx="979714" cy="369332"/>
+          </a:xfrm>
+          <a:prstGeom prst="rect">
+            <a:avLst/>
+          </a:prstGeom>
+          <a:noFill/>
+        </p:spPr>
+        <p:txBody>
+          <a:bodyPr wrap="square" rtlCol="0">
+            <a:spAutoFit/>
+          </a:bodyPr>
+          <a:lstStyle/>
+          <a:p>
+            <a:r>
+              <a:rPr lang="en-US" dirty="0"/>
+              <a:t>279</a:t>
+            </a:r>
+          </a:p>
+        </p:txBody>
+      </p:sp>
+    </p:spTree>
+    <p:extLst>
+      <p:ext uri="{BB962C8B-B14F-4D97-AF65-F5344CB8AC3E}">
+        <p14:creationId xmlns:p14="http://schemas.microsoft.com/office/powerpoint/2010/main" val="644456317"/>
+      </p:ext>
+    </p:extLst>
+  </p:cSld>
+  <p:clrMapOvr>
+    <a:masterClrMapping/>
+  </p:clrMapOvr>
+</p:sld>
+</file>
+
+<file path=ppt/slides/slide3.xml><?xml version="1.0" encoding="utf-8"?>
+<p:sld xmlns:a="http://schemas.openxmlformats.org/drawingml/2006/main" xmlns:r="http://schemas.openxmlformats.org/officeDocument/2006/relationships" xmlns:p="http://schemas.openxmlformats.org/presentationml/2006/main">
+  <p:cSld>
+    <p:spTree>
+      <p:nvGrpSpPr>
+        <p:cNvPr id="1" name=""/>
+        <p:cNvGrpSpPr/>
+        <p:nvPr/>
+      </p:nvGrpSpPr>
+      <p:grpSpPr>
+        <a:xfrm>
+          <a:off x="0" y="0"/>
+          <a:ext cx="0" cy="0"/>
+          <a:chOff x="0" y="0"/>
+          <a:chExt cx="0" cy="0"/>
+        </a:xfrm>
+      </p:grpSpPr>
+      <p:sp>
+        <p:nvSpPr>
+          <p:cNvPr id="2" name="Title 1">
+            <a:extLst>
+              <a:ext uri="{FF2B5EF4-FFF2-40B4-BE49-F238E27FC236}">
+                <a16:creationId xmlns:a16="http://schemas.microsoft.com/office/drawing/2014/main" id="{FCA3A7E1-7023-8E54-7ABD-845E95202B37}"/>
+              </a:ext>
+            </a:extLst>
+          </p:cNvPr>
+          <p:cNvSpPr>
+            <a:spLocks noGrp="1"/>
+          </p:cNvSpPr>
+          <p:nvPr>
+            <p:ph type="title"/>
+          </p:nvPr>
+        </p:nvSpPr>
+        <p:spPr>
+          <a:xfrm>
+            <a:off x="635000" y="640823"/>
+            <a:ext cx="3418659" cy="5583148"/>
+          </a:xfrm>
+        </p:spPr>
+        <p:txBody>
+          <a:bodyPr anchor="ctr">
+            <a:normAutofit/>
+          </a:bodyPr>
+          <a:lstStyle/>
+          <a:p>
+            <a:r>
+              <a:rPr lang="en-IN" sz="5400"/>
+              <a:t>Handle NaN Data</a:t>
+            </a:r>
+          </a:p>
+        </p:txBody>
+      </p:sp>
+      <p:graphicFrame>
+        <p:nvGraphicFramePr>
+          <p:cNvPr id="5" name="Content Placeholder 2">
+            <a:extLst>
+              <a:ext uri="{FF2B5EF4-FFF2-40B4-BE49-F238E27FC236}">
+                <a16:creationId xmlns:a16="http://schemas.microsoft.com/office/drawing/2014/main" id="{9291F0BC-874E-9D30-916F-E3C832B2F9CE}"/>
+              </a:ext>
+            </a:extLst>
+          </p:cNvPr>
+          <p:cNvGraphicFramePr>
+            <a:graphicFrameLocks noGrp="1"/>
+          </p:cNvGraphicFramePr>
+          <p:nvPr>
+            <p:ph idx="1"/>
+          </p:nvPr>
+        </p:nvGraphicFramePr>
+        <p:xfrm>
+          <a:off x="4648018" y="640822"/>
+          <a:ext cx="6900512" cy="5536141"/>
+        </p:xfrm>
+        <a:graphic>
+          <a:graphicData uri="http://schemas.openxmlformats.org/drawingml/2006/diagram">
+            <dgm:relIds xmlns:dgm="http://schemas.openxmlformats.org/drawingml/2006/diagram" xmlns:r="http://schemas.openxmlformats.org/officeDocument/2006/relationships" r:dm="rId2" r:lo="rId3" r:qs="rId4" r:cs="rId5"/>
+          </a:graphicData>
+        </a:graphic>
+      </p:graphicFrame>
+    </p:spTree>
+    <p:extLst>
+      <p:ext uri="{BB962C8B-B14F-4D97-AF65-F5344CB8AC3E}">
+        <p14:creationId xmlns:p14="http://schemas.microsoft.com/office/powerpoint/2010/main" val="2678730472"/>
+      </p:ext>
+    </p:extLst>
+  </p:cSld>
+  <p:clrMapOvr>
+    <a:masterClrMapping/>
+  </p:clrMapOvr>
+</p:sld>
+</file>
+
+<file path=ppt/slides/slide4.xml><?xml version="1.0" encoding="utf-8"?>
+<p:sld xmlns:a="http://schemas.openxmlformats.org/drawingml/2006/main" xmlns:r="http://schemas.openxmlformats.org/officeDocument/2006/relationships" xmlns:p="http://schemas.openxmlformats.org/presentationml/2006/main">
+  <p:cSld>
+    <p:spTree>
+      <p:nvGrpSpPr>
+        <p:cNvPr id="1" name=""/>
+        <p:cNvGrpSpPr/>
+        <p:nvPr/>
+      </p:nvGrpSpPr>
+      <p:grpSpPr>
+        <a:xfrm>
+          <a:off x="0" y="0"/>
+          <a:ext cx="0" cy="0"/>
+          <a:chOff x="0" y="0"/>
+          <a:chExt cx="0" cy="0"/>
+        </a:xfrm>
+      </p:grpSpPr>
+      <p:sp>
+        <p:nvSpPr>
+          <p:cNvPr id="2" name="Title 1">
+            <a:extLst>
+              <a:ext uri="{FF2B5EF4-FFF2-40B4-BE49-F238E27FC236}">
+                <a16:creationId xmlns:a16="http://schemas.microsoft.com/office/drawing/2014/main" id="{58C0ED9E-A0C2-DD3F-5543-36E9E57CE736}"/>
+              </a:ext>
+            </a:extLst>
+          </p:cNvPr>
+          <p:cNvSpPr>
+            <a:spLocks noGrp="1"/>
+          </p:cNvSpPr>
+          <p:nvPr>
+            <p:ph type="title"/>
+          </p:nvPr>
+        </p:nvSpPr>
+        <p:spPr>
+          <a:xfrm>
+            <a:off x="1043631" y="809898"/>
+            <a:ext cx="10173010" cy="1554480"/>
+          </a:xfrm>
+        </p:spPr>
+        <p:txBody>
+          <a:bodyPr anchor="ctr">
+            <a:normAutofit/>
+          </a:bodyPr>
+          <a:lstStyle/>
+          <a:p>
+            <a:r>
+              <a:rPr lang="en-IN" sz="4800"/>
+              <a:t>How to deal with Categorical Data</a:t>
+            </a:r>
+          </a:p>
+        </p:txBody>
+      </p:sp>
+      <p:graphicFrame>
+        <p:nvGraphicFramePr>
+          <p:cNvPr id="5" name="Content Placeholder 2">
+            <a:extLst>
+              <a:ext uri="{FF2B5EF4-FFF2-40B4-BE49-F238E27FC236}">
+                <a16:creationId xmlns:a16="http://schemas.microsoft.com/office/drawing/2014/main" id="{B58A6042-8F9D-0A15-A434-6B397D8A5BAC}"/>
+              </a:ext>
+            </a:extLst>
+          </p:cNvPr>
+          <p:cNvGraphicFramePr>
+            <a:graphicFrameLocks noGrp="1"/>
+          </p:cNvGraphicFramePr>
+          <p:nvPr>
+            <p:ph idx="1"/>
+          </p:nvPr>
+        </p:nvGraphicFramePr>
+        <p:xfrm>
+          <a:off x="904602" y="3017519"/>
+          <a:ext cx="10378440" cy="3209902"/>
+        </p:xfrm>
+        <a:graphic>
+          <a:graphicData uri="http://schemas.openxmlformats.org/drawingml/2006/diagram">
+            <dgm:relIds xmlns:dgm="http://schemas.openxmlformats.org/drawingml/2006/diagram" xmlns:r="http://schemas.openxmlformats.org/officeDocument/2006/relationships" r:dm="rId2" r:lo="rId3" r:qs="rId4" r:cs="rId5"/>
+          </a:graphicData>
+        </a:graphic>
+      </p:graphicFrame>
+    </p:spTree>
+    <p:extLst>
+      <p:ext uri="{BB962C8B-B14F-4D97-AF65-F5344CB8AC3E}">
+        <p14:creationId xmlns:p14="http://schemas.microsoft.com/office/powerpoint/2010/main" val="104753838"/>
+      </p:ext>
+    </p:extLst>
+  </p:cSld>
+  <p:clrMapOvr>
+    <a:masterClrMapping/>
+  </p:clrMapOvr>
+</p:sld>
+</file>
+
+<file path=ppt/slides/slide5.xml><?xml version="1.0" encoding="utf-8"?>
+<p:sld xmlns:a="http://schemas.openxmlformats.org/drawingml/2006/main" xmlns:r="http://schemas.openxmlformats.org/officeDocument/2006/relationships" xmlns:p="http://schemas.openxmlformats.org/presentationml/2006/main">
+  <p:cSld>
+    <p:spTree>
+      <p:nvGrpSpPr>
+        <p:cNvPr id="1" name=""/>
+        <p:cNvGrpSpPr/>
+        <p:nvPr/>
+      </p:nvGrpSpPr>
+      <p:grpSpPr>
+        <a:xfrm>
+          <a:off x="0" y="0"/>
+          <a:ext cx="0" cy="0"/>
+          <a:chOff x="0" y="0"/>
+          <a:chExt cx="0" cy="0"/>
+        </a:xfrm>
+      </p:grpSpPr>
+      <p:sp>
+        <p:nvSpPr>
+          <p:cNvPr id="2" name="Title 1">
+            <a:extLst>
+              <a:ext uri="{FF2B5EF4-FFF2-40B4-BE49-F238E27FC236}">
+                <a16:creationId xmlns:a16="http://schemas.microsoft.com/office/drawing/2014/main" id="{8A6164EB-23D5-0C52-4F2A-6AE57457E8D5}"/>
+              </a:ext>
+            </a:extLst>
+          </p:cNvPr>
+          <p:cNvSpPr>
+            <a:spLocks noGrp="1"/>
+          </p:cNvSpPr>
+          <p:nvPr>
+            <p:ph type="title"/>
+          </p:nvPr>
+        </p:nvSpPr>
+        <p:spPr>
+          <a:xfrm>
+            <a:off x="1153618" y="1239927"/>
+            <a:ext cx="4008586" cy="4680583"/>
+          </a:xfrm>
+        </p:spPr>
+        <p:txBody>
+          <a:bodyPr anchor="ctr">
+            <a:normAutofit/>
+          </a:bodyPr>
+          <a:lstStyle/>
+          <a:p>
+            <a:r>
+              <a:rPr lang="en-IN" sz="5200"/>
+              <a:t>Deleting the columns</a:t>
+            </a:r>
+          </a:p>
+        </p:txBody>
+      </p:sp>
+      <p:sp>
+        <p:nvSpPr>
+          <p:cNvPr id="3" name="Content Placeholder 2">
+            <a:extLst>
+              <a:ext uri="{FF2B5EF4-FFF2-40B4-BE49-F238E27FC236}">
+                <a16:creationId xmlns:a16="http://schemas.microsoft.com/office/drawing/2014/main" id="{7E241F60-462A-80BB-5584-AE47E954CABF}"/>
+              </a:ext>
+            </a:extLst>
+          </p:cNvPr>
+          <p:cNvSpPr>
+            <a:spLocks noGrp="1"/>
+          </p:cNvSpPr>
+          <p:nvPr>
+            <p:ph idx="1"/>
+          </p:nvPr>
+        </p:nvSpPr>
+        <p:spPr>
+          <a:xfrm>
+            <a:off x="6291923" y="1239927"/>
+            <a:ext cx="4971824" cy="4680583"/>
+          </a:xfrm>
+        </p:spPr>
+        <p:txBody>
+          <a:bodyPr anchor="ctr">
+            <a:normAutofit/>
+          </a:bodyPr>
+          <a:lstStyle/>
+          <a:p>
+            <a:r>
+              <a:rPr lang="en-IN" sz="2000"/>
+              <a:t>The easier way, is to delete all the categorical columns and deal only with the numeric columns.</a:t>
+            </a:r>
+          </a:p>
+          <a:p>
+            <a:endParaRPr lang="en-IN" sz="2000"/>
+          </a:p>
+        </p:txBody>
+      </p:sp>
+    </p:spTree>
+    <p:extLst>
+      <p:ext uri="{BB962C8B-B14F-4D97-AF65-F5344CB8AC3E}">
+        <p14:creationId xmlns:p14="http://schemas.microsoft.com/office/powerpoint/2010/main" val="624712687"/>
+      </p:ext>
+    </p:extLst>
+  </p:cSld>
+  <p:clrMapOvr>
+    <a:masterClrMapping/>
+  </p:clrMapOvr>
+</p:sld>
+</file>
+
+<file path=ppt/slides/slide6.xml><?xml version="1.0" encoding="utf-8"?>
 <p:sld xmlns:a="http://schemas.openxmlformats.org/drawingml/2006/main" xmlns:r="http://schemas.openxmlformats.org/officeDocument/2006/relationships" xmlns:p="http://schemas.openxmlformats.org/presentationml/2006/main">
   <p:cSld>
     <p:spTree>
@@ -19020,382 +21262,6 @@
     <p:extLst>
       <p:ext uri="{BB962C8B-B14F-4D97-AF65-F5344CB8AC3E}">
         <p14:creationId xmlns:p14="http://schemas.microsoft.com/office/powerpoint/2010/main" val="2095888896"/>
-      </p:ext>
-    </p:extLst>
-  </p:cSld>
-  <p:clrMapOvr>
-    <a:masterClrMapping/>
-  </p:clrMapOvr>
-</p:sld>
-</file>
-
-<file path=ppt/slides/slide3.xml><?xml version="1.0" encoding="utf-8"?>
-<p:sld xmlns:a="http://schemas.openxmlformats.org/drawingml/2006/main" xmlns:r="http://schemas.openxmlformats.org/officeDocument/2006/relationships" xmlns:p="http://schemas.openxmlformats.org/presentationml/2006/main">
-  <p:cSld>
-    <p:spTree>
-      <p:nvGrpSpPr>
-        <p:cNvPr id="1" name=""/>
-        <p:cNvGrpSpPr/>
-        <p:nvPr/>
-      </p:nvGrpSpPr>
-      <p:grpSpPr>
-        <a:xfrm>
-          <a:off x="0" y="0"/>
-          <a:ext cx="0" cy="0"/>
-          <a:chOff x="0" y="0"/>
-          <a:chExt cx="0" cy="0"/>
-        </a:xfrm>
-      </p:grpSpPr>
-      <p:sp>
-        <p:nvSpPr>
-          <p:cNvPr id="2" name="Title 1">
-            <a:extLst>
-              <a:ext uri="{FF2B5EF4-FFF2-40B4-BE49-F238E27FC236}">
-                <a16:creationId xmlns:a16="http://schemas.microsoft.com/office/drawing/2014/main" id="{4C348C68-F592-61EC-A858-57EEB7374F4F}"/>
-              </a:ext>
-            </a:extLst>
-          </p:cNvPr>
-          <p:cNvSpPr>
-            <a:spLocks noGrp="1"/>
-          </p:cNvSpPr>
-          <p:nvPr>
-            <p:ph type="title"/>
-          </p:nvPr>
-        </p:nvSpPr>
-        <p:spPr>
-          <a:xfrm>
-            <a:off x="1043631" y="809898"/>
-            <a:ext cx="10173010" cy="1554480"/>
-          </a:xfrm>
-        </p:spPr>
-        <p:txBody>
-          <a:bodyPr anchor="ctr">
-            <a:normAutofit/>
-          </a:bodyPr>
-          <a:lstStyle/>
-          <a:p>
-            <a:r>
-              <a:rPr lang="en-IN" sz="4800"/>
-              <a:t>Points</a:t>
-            </a:r>
-          </a:p>
-        </p:txBody>
-      </p:sp>
-      <p:graphicFrame>
-        <p:nvGraphicFramePr>
-          <p:cNvPr id="5" name="Content Placeholder 2">
-            <a:extLst>
-              <a:ext uri="{FF2B5EF4-FFF2-40B4-BE49-F238E27FC236}">
-                <a16:creationId xmlns:a16="http://schemas.microsoft.com/office/drawing/2014/main" id="{EE07704A-5F3D-5A66-19A0-1F71292E6618}"/>
-              </a:ext>
-            </a:extLst>
-          </p:cNvPr>
-          <p:cNvGraphicFramePr>
-            <a:graphicFrameLocks noGrp="1"/>
-          </p:cNvGraphicFramePr>
-          <p:nvPr>
-            <p:ph idx="1"/>
-          </p:nvPr>
-        </p:nvGraphicFramePr>
-        <p:xfrm>
-          <a:off x="904602" y="3017519"/>
-          <a:ext cx="10378440" cy="3209902"/>
-        </p:xfrm>
-        <a:graphic>
-          <a:graphicData uri="http://schemas.openxmlformats.org/drawingml/2006/diagram">
-            <dgm:relIds xmlns:dgm="http://schemas.openxmlformats.org/drawingml/2006/diagram" xmlns:r="http://schemas.openxmlformats.org/officeDocument/2006/relationships" r:dm="rId2" r:lo="rId3" r:qs="rId4" r:cs="rId5"/>
-          </a:graphicData>
-        </a:graphic>
-      </p:graphicFrame>
-    </p:spTree>
-    <p:extLst>
-      <p:ext uri="{BB962C8B-B14F-4D97-AF65-F5344CB8AC3E}">
-        <p14:creationId xmlns:p14="http://schemas.microsoft.com/office/powerpoint/2010/main" val="597579998"/>
-      </p:ext>
-    </p:extLst>
-  </p:cSld>
-  <p:clrMapOvr>
-    <a:masterClrMapping/>
-  </p:clrMapOvr>
-</p:sld>
-</file>
-
-<file path=ppt/slides/slide4.xml><?xml version="1.0" encoding="utf-8"?>
-<p:sld xmlns:a="http://schemas.openxmlformats.org/drawingml/2006/main" xmlns:r="http://schemas.openxmlformats.org/officeDocument/2006/relationships" xmlns:p="http://schemas.openxmlformats.org/presentationml/2006/main">
-  <p:cSld>
-    <p:spTree>
-      <p:nvGrpSpPr>
-        <p:cNvPr id="1" name=""/>
-        <p:cNvGrpSpPr/>
-        <p:nvPr/>
-      </p:nvGrpSpPr>
-      <p:grpSpPr>
-        <a:xfrm>
-          <a:off x="0" y="0"/>
-          <a:ext cx="0" cy="0"/>
-          <a:chOff x="0" y="0"/>
-          <a:chExt cx="0" cy="0"/>
-        </a:xfrm>
-      </p:grpSpPr>
-      <p:sp>
-        <p:nvSpPr>
-          <p:cNvPr id="2" name="Title 1">
-            <a:extLst>
-              <a:ext uri="{FF2B5EF4-FFF2-40B4-BE49-F238E27FC236}">
-                <a16:creationId xmlns:a16="http://schemas.microsoft.com/office/drawing/2014/main" id="{FCA3A7E1-7023-8E54-7ABD-845E95202B37}"/>
-              </a:ext>
-            </a:extLst>
-          </p:cNvPr>
-          <p:cNvSpPr>
-            <a:spLocks noGrp="1"/>
-          </p:cNvSpPr>
-          <p:nvPr>
-            <p:ph type="title"/>
-          </p:nvPr>
-        </p:nvSpPr>
-        <p:spPr>
-          <a:xfrm>
-            <a:off x="635000" y="640823"/>
-            <a:ext cx="3418659" cy="5583148"/>
-          </a:xfrm>
-        </p:spPr>
-        <p:txBody>
-          <a:bodyPr anchor="ctr">
-            <a:normAutofit/>
-          </a:bodyPr>
-          <a:lstStyle/>
-          <a:p>
-            <a:r>
-              <a:rPr lang="en-IN" sz="5400"/>
-              <a:t>Handle NaN Data</a:t>
-            </a:r>
-          </a:p>
-        </p:txBody>
-      </p:sp>
-      <p:graphicFrame>
-        <p:nvGraphicFramePr>
-          <p:cNvPr id="5" name="Content Placeholder 2">
-            <a:extLst>
-              <a:ext uri="{FF2B5EF4-FFF2-40B4-BE49-F238E27FC236}">
-                <a16:creationId xmlns:a16="http://schemas.microsoft.com/office/drawing/2014/main" id="{9291F0BC-874E-9D30-916F-E3C832B2F9CE}"/>
-              </a:ext>
-            </a:extLst>
-          </p:cNvPr>
-          <p:cNvGraphicFramePr>
-            <a:graphicFrameLocks noGrp="1"/>
-          </p:cNvGraphicFramePr>
-          <p:nvPr>
-            <p:ph idx="1"/>
-          </p:nvPr>
-        </p:nvGraphicFramePr>
-        <p:xfrm>
-          <a:off x="4648018" y="640822"/>
-          <a:ext cx="6900512" cy="5536141"/>
-        </p:xfrm>
-        <a:graphic>
-          <a:graphicData uri="http://schemas.openxmlformats.org/drawingml/2006/diagram">
-            <dgm:relIds xmlns:dgm="http://schemas.openxmlformats.org/drawingml/2006/diagram" xmlns:r="http://schemas.openxmlformats.org/officeDocument/2006/relationships" r:dm="rId2" r:lo="rId3" r:qs="rId4" r:cs="rId5"/>
-          </a:graphicData>
-        </a:graphic>
-      </p:graphicFrame>
-    </p:spTree>
-    <p:extLst>
-      <p:ext uri="{BB962C8B-B14F-4D97-AF65-F5344CB8AC3E}">
-        <p14:creationId xmlns:p14="http://schemas.microsoft.com/office/powerpoint/2010/main" val="2678730472"/>
-      </p:ext>
-    </p:extLst>
-  </p:cSld>
-  <p:clrMapOvr>
-    <a:masterClrMapping/>
-  </p:clrMapOvr>
-</p:sld>
-</file>
-
-<file path=ppt/slides/slide5.xml><?xml version="1.0" encoding="utf-8"?>
-<p:sld xmlns:a="http://schemas.openxmlformats.org/drawingml/2006/main" xmlns:r="http://schemas.openxmlformats.org/officeDocument/2006/relationships" xmlns:p="http://schemas.openxmlformats.org/presentationml/2006/main">
-  <p:cSld>
-    <p:spTree>
-      <p:nvGrpSpPr>
-        <p:cNvPr id="1" name=""/>
-        <p:cNvGrpSpPr/>
-        <p:nvPr/>
-      </p:nvGrpSpPr>
-      <p:grpSpPr>
-        <a:xfrm>
-          <a:off x="0" y="0"/>
-          <a:ext cx="0" cy="0"/>
-          <a:chOff x="0" y="0"/>
-          <a:chExt cx="0" cy="0"/>
-        </a:xfrm>
-      </p:grpSpPr>
-      <p:sp>
-        <p:nvSpPr>
-          <p:cNvPr id="2" name="Title 1">
-            <a:extLst>
-              <a:ext uri="{FF2B5EF4-FFF2-40B4-BE49-F238E27FC236}">
-                <a16:creationId xmlns:a16="http://schemas.microsoft.com/office/drawing/2014/main" id="{58C0ED9E-A0C2-DD3F-5543-36E9E57CE736}"/>
-              </a:ext>
-            </a:extLst>
-          </p:cNvPr>
-          <p:cNvSpPr>
-            <a:spLocks noGrp="1"/>
-          </p:cNvSpPr>
-          <p:nvPr>
-            <p:ph type="title"/>
-          </p:nvPr>
-        </p:nvSpPr>
-        <p:spPr>
-          <a:xfrm>
-            <a:off x="1043631" y="809898"/>
-            <a:ext cx="10173010" cy="1554480"/>
-          </a:xfrm>
-        </p:spPr>
-        <p:txBody>
-          <a:bodyPr anchor="ctr">
-            <a:normAutofit/>
-          </a:bodyPr>
-          <a:lstStyle/>
-          <a:p>
-            <a:r>
-              <a:rPr lang="en-IN" sz="4800"/>
-              <a:t>How to deal with Categorical Data</a:t>
-            </a:r>
-          </a:p>
-        </p:txBody>
-      </p:sp>
-      <p:graphicFrame>
-        <p:nvGraphicFramePr>
-          <p:cNvPr id="5" name="Content Placeholder 2">
-            <a:extLst>
-              <a:ext uri="{FF2B5EF4-FFF2-40B4-BE49-F238E27FC236}">
-                <a16:creationId xmlns:a16="http://schemas.microsoft.com/office/drawing/2014/main" id="{B58A6042-8F9D-0A15-A434-6B397D8A5BAC}"/>
-              </a:ext>
-            </a:extLst>
-          </p:cNvPr>
-          <p:cNvGraphicFramePr>
-            <a:graphicFrameLocks noGrp="1"/>
-          </p:cNvGraphicFramePr>
-          <p:nvPr>
-            <p:ph idx="1"/>
-          </p:nvPr>
-        </p:nvGraphicFramePr>
-        <p:xfrm>
-          <a:off x="904602" y="3017519"/>
-          <a:ext cx="10378440" cy="3209902"/>
-        </p:xfrm>
-        <a:graphic>
-          <a:graphicData uri="http://schemas.openxmlformats.org/drawingml/2006/diagram">
-            <dgm:relIds xmlns:dgm="http://schemas.openxmlformats.org/drawingml/2006/diagram" xmlns:r="http://schemas.openxmlformats.org/officeDocument/2006/relationships" r:dm="rId2" r:lo="rId3" r:qs="rId4" r:cs="rId5"/>
-          </a:graphicData>
-        </a:graphic>
-      </p:graphicFrame>
-    </p:spTree>
-    <p:extLst>
-      <p:ext uri="{BB962C8B-B14F-4D97-AF65-F5344CB8AC3E}">
-        <p14:creationId xmlns:p14="http://schemas.microsoft.com/office/powerpoint/2010/main" val="104753838"/>
-      </p:ext>
-    </p:extLst>
-  </p:cSld>
-  <p:clrMapOvr>
-    <a:masterClrMapping/>
-  </p:clrMapOvr>
-</p:sld>
-</file>
-
-<file path=ppt/slides/slide6.xml><?xml version="1.0" encoding="utf-8"?>
-<p:sld xmlns:a="http://schemas.openxmlformats.org/drawingml/2006/main" xmlns:r="http://schemas.openxmlformats.org/officeDocument/2006/relationships" xmlns:p="http://schemas.openxmlformats.org/presentationml/2006/main">
-  <p:cSld>
-    <p:spTree>
-      <p:nvGrpSpPr>
-        <p:cNvPr id="1" name=""/>
-        <p:cNvGrpSpPr/>
-        <p:nvPr/>
-      </p:nvGrpSpPr>
-      <p:grpSpPr>
-        <a:xfrm>
-          <a:off x="0" y="0"/>
-          <a:ext cx="0" cy="0"/>
-          <a:chOff x="0" y="0"/>
-          <a:chExt cx="0" cy="0"/>
-        </a:xfrm>
-      </p:grpSpPr>
-      <p:sp>
-        <p:nvSpPr>
-          <p:cNvPr id="2" name="Title 1">
-            <a:extLst>
-              <a:ext uri="{FF2B5EF4-FFF2-40B4-BE49-F238E27FC236}">
-                <a16:creationId xmlns:a16="http://schemas.microsoft.com/office/drawing/2014/main" id="{8A6164EB-23D5-0C52-4F2A-6AE57457E8D5}"/>
-              </a:ext>
-            </a:extLst>
-          </p:cNvPr>
-          <p:cNvSpPr>
-            <a:spLocks noGrp="1"/>
-          </p:cNvSpPr>
-          <p:nvPr>
-            <p:ph type="title"/>
-          </p:nvPr>
-        </p:nvSpPr>
-        <p:spPr>
-          <a:xfrm>
-            <a:off x="1153618" y="1239927"/>
-            <a:ext cx="4008586" cy="4680583"/>
-          </a:xfrm>
-        </p:spPr>
-        <p:txBody>
-          <a:bodyPr anchor="ctr">
-            <a:normAutofit/>
-          </a:bodyPr>
-          <a:lstStyle/>
-          <a:p>
-            <a:r>
-              <a:rPr lang="en-IN" sz="5200"/>
-              <a:t>Deleting the columns</a:t>
-            </a:r>
-          </a:p>
-        </p:txBody>
-      </p:sp>
-      <p:sp>
-        <p:nvSpPr>
-          <p:cNvPr id="3" name="Content Placeholder 2">
-            <a:extLst>
-              <a:ext uri="{FF2B5EF4-FFF2-40B4-BE49-F238E27FC236}">
-                <a16:creationId xmlns:a16="http://schemas.microsoft.com/office/drawing/2014/main" id="{7E241F60-462A-80BB-5584-AE47E954CABF}"/>
-              </a:ext>
-            </a:extLst>
-          </p:cNvPr>
-          <p:cNvSpPr>
-            <a:spLocks noGrp="1"/>
-          </p:cNvSpPr>
-          <p:nvPr>
-            <p:ph idx="1"/>
-          </p:nvPr>
-        </p:nvSpPr>
-        <p:spPr>
-          <a:xfrm>
-            <a:off x="6291923" y="1239927"/>
-            <a:ext cx="4971824" cy="4680583"/>
-          </a:xfrm>
-        </p:spPr>
-        <p:txBody>
-          <a:bodyPr anchor="ctr">
-            <a:normAutofit/>
-          </a:bodyPr>
-          <a:lstStyle/>
-          <a:p>
-            <a:r>
-              <a:rPr lang="en-IN" sz="2000"/>
-              <a:t>The easier way, is to delete all the categorical columns and deal only with the numeric columns.</a:t>
-            </a:r>
-          </a:p>
-          <a:p>
-            <a:endParaRPr lang="en-IN" sz="2000"/>
-          </a:p>
-        </p:txBody>
-      </p:sp>
-    </p:spTree>
-    <p:extLst>
-      <p:ext uri="{BB962C8B-B14F-4D97-AF65-F5344CB8AC3E}">
-        <p14:creationId xmlns:p14="http://schemas.microsoft.com/office/powerpoint/2010/main" val="624712687"/>
       </p:ext>
     </p:extLst>
   </p:cSld>
@@ -19652,7 +21518,7 @@
                   <a:schemeClr val="tx2"/>
                 </a:solidFill>
               </a:rPr>
-              <a:t>We can take only the columns which have 10 unique categories or less</a:t>
+              <a:t>We can take only the columns which have 10 unique categories or less in the initial modelling strategy</a:t>
             </a:r>
           </a:p>
           <a:p>
@@ -20113,4 +21979,299 @@
     </a:ext>
   </a:extLst>
 </a:theme>
+</file>
+
+<file path=ppt/theme/theme2.xml><?xml version="1.0" encoding="utf-8"?>
+<a:theme xmlns:a="http://schemas.openxmlformats.org/drawingml/2006/main" name="Office Theme">
+  <a:themeElements>
+    <a:clrScheme name="Office">
+      <a:dk1>
+        <a:sysClr val="windowText" lastClr="000000"/>
+      </a:dk1>
+      <a:lt1>
+        <a:sysClr val="window" lastClr="FFFFFF"/>
+      </a:lt1>
+      <a:dk2>
+        <a:srgbClr val="44546A"/>
+      </a:dk2>
+      <a:lt2>
+        <a:srgbClr val="E7E6E6"/>
+      </a:lt2>
+      <a:accent1>
+        <a:srgbClr val="4472C4"/>
+      </a:accent1>
+      <a:accent2>
+        <a:srgbClr val="ED7D31"/>
+      </a:accent2>
+      <a:accent3>
+        <a:srgbClr val="A5A5A5"/>
+      </a:accent3>
+      <a:accent4>
+        <a:srgbClr val="FFC000"/>
+      </a:accent4>
+      <a:accent5>
+        <a:srgbClr val="5B9BD5"/>
+      </a:accent5>
+      <a:accent6>
+        <a:srgbClr val="70AD47"/>
+      </a:accent6>
+      <a:hlink>
+        <a:srgbClr val="0563C1"/>
+      </a:hlink>
+      <a:folHlink>
+        <a:srgbClr val="954F72"/>
+      </a:folHlink>
+    </a:clrScheme>
+    <a:fontScheme name="Office">
+      <a:majorFont>
+        <a:latin typeface="Calibri Light" panose="020F0302020204030204"/>
+        <a:ea typeface=""/>
+        <a:cs typeface=""/>
+        <a:font script="Jpan" typeface="游ゴシック Light"/>
+        <a:font script="Hang" typeface="맑은 고딕"/>
+        <a:font script="Hans" typeface="等线 Light"/>
+        <a:font script="Hant" typeface="新細明體"/>
+        <a:font script="Arab" typeface="Times New Roman"/>
+        <a:font script="Hebr" typeface="Times New Roman"/>
+        <a:font script="Thai" typeface="Angsana New"/>
+        <a:font script="Ethi" typeface="Nyala"/>
+        <a:font script="Beng" typeface="Vrinda"/>
+        <a:font script="Gujr" typeface="Shruti"/>
+        <a:font script="Khmr" typeface="MoolBoran"/>
+        <a:font script="Knda" typeface="Tunga"/>
+        <a:font script="Guru" typeface="Raavi"/>
+        <a:font script="Cans" typeface="Euphemia"/>
+        <a:font script="Cher" typeface="Plantagenet Cherokee"/>
+        <a:font script="Yiii" typeface="Microsoft Yi Baiti"/>
+        <a:font script="Tibt" typeface="Microsoft Himalaya"/>
+        <a:font script="Thaa" typeface="MV Boli"/>
+        <a:font script="Deva" typeface="Mangal"/>
+        <a:font script="Telu" typeface="Gautami"/>
+        <a:font script="Taml" typeface="Latha"/>
+        <a:font script="Syrc" typeface="Estrangelo Edessa"/>
+        <a:font script="Orya" typeface="Kalinga"/>
+        <a:font script="Mlym" typeface="Kartika"/>
+        <a:font script="Laoo" typeface="DokChampa"/>
+        <a:font script="Sinh" typeface="Iskoola Pota"/>
+        <a:font script="Mong" typeface="Mongolian Baiti"/>
+        <a:font script="Viet" typeface="Times New Roman"/>
+        <a:font script="Uigh" typeface="Microsoft Uighur"/>
+        <a:font script="Geor" typeface="Sylfaen"/>
+        <a:font script="Armn" typeface="Arial"/>
+        <a:font script="Bugi" typeface="Leelawadee UI"/>
+        <a:font script="Bopo" typeface="Microsoft JhengHei"/>
+        <a:font script="Java" typeface="Javanese Text"/>
+        <a:font script="Lisu" typeface="Segoe UI"/>
+        <a:font script="Mymr" typeface="Myanmar Text"/>
+        <a:font script="Nkoo" typeface="Ebrima"/>
+        <a:font script="Olck" typeface="Nirmala UI"/>
+        <a:font script="Osma" typeface="Ebrima"/>
+        <a:font script="Phag" typeface="Phagspa"/>
+        <a:font script="Syrn" typeface="Estrangelo Edessa"/>
+        <a:font script="Syrj" typeface="Estrangelo Edessa"/>
+        <a:font script="Syre" typeface="Estrangelo Edessa"/>
+        <a:font script="Sora" typeface="Nirmala UI"/>
+        <a:font script="Tale" typeface="Microsoft Tai Le"/>
+        <a:font script="Talu" typeface="Microsoft New Tai Lue"/>
+        <a:font script="Tfng" typeface="Ebrima"/>
+      </a:majorFont>
+      <a:minorFont>
+        <a:latin typeface="Calibri" panose="020F0502020204030204"/>
+        <a:ea typeface=""/>
+        <a:cs typeface=""/>
+        <a:font script="Jpan" typeface="游ゴシック"/>
+        <a:font script="Hang" typeface="맑은 고딕"/>
+        <a:font script="Hans" typeface="等线"/>
+        <a:font script="Hant" typeface="新細明體"/>
+        <a:font script="Arab" typeface="Arial"/>
+        <a:font script="Hebr" typeface="Arial"/>
+        <a:font script="Thai" typeface="Cordia New"/>
+        <a:font script="Ethi" typeface="Nyala"/>
+        <a:font script="Beng" typeface="Vrinda"/>
+        <a:font script="Gujr" typeface="Shruti"/>
+        <a:font script="Khmr" typeface="DaunPenh"/>
+        <a:font script="Knda" typeface="Tunga"/>
+        <a:font script="Guru" typeface="Raavi"/>
+        <a:font script="Cans" typeface="Euphemia"/>
+        <a:font script="Cher" typeface="Plantagenet Cherokee"/>
+        <a:font script="Yiii" typeface="Microsoft Yi Baiti"/>
+        <a:font script="Tibt" typeface="Microsoft Himalaya"/>
+        <a:font script="Thaa" typeface="MV Boli"/>
+        <a:font script="Deva" typeface="Mangal"/>
+        <a:font script="Telu" typeface="Gautami"/>
+        <a:font script="Taml" typeface="Latha"/>
+        <a:font script="Syrc" typeface="Estrangelo Edessa"/>
+        <a:font script="Orya" typeface="Kalinga"/>
+        <a:font script="Mlym" typeface="Kartika"/>
+        <a:font script="Laoo" typeface="DokChampa"/>
+        <a:font script="Sinh" typeface="Iskoola Pota"/>
+        <a:font script="Mong" typeface="Mongolian Baiti"/>
+        <a:font script="Viet" typeface="Arial"/>
+        <a:font script="Uigh" typeface="Microsoft Uighur"/>
+        <a:font script="Geor" typeface="Sylfaen"/>
+        <a:font script="Armn" typeface="Arial"/>
+        <a:font script="Bugi" typeface="Leelawadee UI"/>
+        <a:font script="Bopo" typeface="Microsoft JhengHei"/>
+        <a:font script="Java" typeface="Javanese Text"/>
+        <a:font script="Lisu" typeface="Segoe UI"/>
+        <a:font script="Mymr" typeface="Myanmar Text"/>
+        <a:font script="Nkoo" typeface="Ebrima"/>
+        <a:font script="Olck" typeface="Nirmala UI"/>
+        <a:font script="Osma" typeface="Ebrima"/>
+        <a:font script="Phag" typeface="Phagspa"/>
+        <a:font script="Syrn" typeface="Estrangelo Edessa"/>
+        <a:font script="Syrj" typeface="Estrangelo Edessa"/>
+        <a:font script="Syre" typeface="Estrangelo Edessa"/>
+        <a:font script="Sora" typeface="Nirmala UI"/>
+        <a:font script="Tale" typeface="Microsoft Tai Le"/>
+        <a:font script="Talu" typeface="Microsoft New Tai Lue"/>
+        <a:font script="Tfng" typeface="Ebrima"/>
+      </a:minorFont>
+    </a:fontScheme>
+    <a:fmtScheme name="Office">
+      <a:fillStyleLst>
+        <a:solidFill>
+          <a:schemeClr val="phClr"/>
+        </a:solidFill>
+        <a:gradFill rotWithShape="1">
+          <a:gsLst>
+            <a:gs pos="0">
+              <a:schemeClr val="phClr">
+                <a:lumMod val="110000"/>
+                <a:satMod val="105000"/>
+                <a:tint val="67000"/>
+              </a:schemeClr>
+            </a:gs>
+            <a:gs pos="50000">
+              <a:schemeClr val="phClr">
+                <a:lumMod val="105000"/>
+                <a:satMod val="103000"/>
+                <a:tint val="73000"/>
+              </a:schemeClr>
+            </a:gs>
+            <a:gs pos="100000">
+              <a:schemeClr val="phClr">
+                <a:lumMod val="105000"/>
+                <a:satMod val="109000"/>
+                <a:tint val="81000"/>
+              </a:schemeClr>
+            </a:gs>
+          </a:gsLst>
+          <a:lin ang="5400000" scaled="0"/>
+        </a:gradFill>
+        <a:gradFill rotWithShape="1">
+          <a:gsLst>
+            <a:gs pos="0">
+              <a:schemeClr val="phClr">
+                <a:satMod val="103000"/>
+                <a:lumMod val="102000"/>
+                <a:tint val="94000"/>
+              </a:schemeClr>
+            </a:gs>
+            <a:gs pos="50000">
+              <a:schemeClr val="phClr">
+                <a:satMod val="110000"/>
+                <a:lumMod val="100000"/>
+                <a:shade val="100000"/>
+              </a:schemeClr>
+            </a:gs>
+            <a:gs pos="100000">
+              <a:schemeClr val="phClr">
+                <a:lumMod val="99000"/>
+                <a:satMod val="120000"/>
+                <a:shade val="78000"/>
+              </a:schemeClr>
+            </a:gs>
+          </a:gsLst>
+          <a:lin ang="5400000" scaled="0"/>
+        </a:gradFill>
+      </a:fillStyleLst>
+      <a:lnStyleLst>
+        <a:ln w="6350" cap="flat" cmpd="sng" algn="ctr">
+          <a:solidFill>
+            <a:schemeClr val="phClr"/>
+          </a:solidFill>
+          <a:prstDash val="solid"/>
+          <a:miter lim="800000"/>
+        </a:ln>
+        <a:ln w="12700" cap="flat" cmpd="sng" algn="ctr">
+          <a:solidFill>
+            <a:schemeClr val="phClr"/>
+          </a:solidFill>
+          <a:prstDash val="solid"/>
+          <a:miter lim="800000"/>
+        </a:ln>
+        <a:ln w="19050" cap="flat" cmpd="sng" algn="ctr">
+          <a:solidFill>
+            <a:schemeClr val="phClr"/>
+          </a:solidFill>
+          <a:prstDash val="solid"/>
+          <a:miter lim="800000"/>
+        </a:ln>
+      </a:lnStyleLst>
+      <a:effectStyleLst>
+        <a:effectStyle>
+          <a:effectLst/>
+        </a:effectStyle>
+        <a:effectStyle>
+          <a:effectLst/>
+        </a:effectStyle>
+        <a:effectStyle>
+          <a:effectLst>
+            <a:outerShdw blurRad="57150" dist="19050" dir="5400000" algn="ctr" rotWithShape="0">
+              <a:srgbClr val="000000">
+                <a:alpha val="63000"/>
+              </a:srgbClr>
+            </a:outerShdw>
+          </a:effectLst>
+        </a:effectStyle>
+      </a:effectStyleLst>
+      <a:bgFillStyleLst>
+        <a:solidFill>
+          <a:schemeClr val="phClr"/>
+        </a:solidFill>
+        <a:solidFill>
+          <a:schemeClr val="phClr">
+            <a:tint val="95000"/>
+            <a:satMod val="170000"/>
+          </a:schemeClr>
+        </a:solidFill>
+        <a:gradFill rotWithShape="1">
+          <a:gsLst>
+            <a:gs pos="0">
+              <a:schemeClr val="phClr">
+                <a:tint val="93000"/>
+                <a:satMod val="150000"/>
+                <a:shade val="98000"/>
+                <a:lumMod val="102000"/>
+              </a:schemeClr>
+            </a:gs>
+            <a:gs pos="50000">
+              <a:schemeClr val="phClr">
+                <a:tint val="98000"/>
+                <a:satMod val="130000"/>
+                <a:shade val="90000"/>
+                <a:lumMod val="103000"/>
+              </a:schemeClr>
+            </a:gs>
+            <a:gs pos="100000">
+              <a:schemeClr val="phClr">
+                <a:shade val="63000"/>
+                <a:satMod val="120000"/>
+              </a:schemeClr>
+            </a:gs>
+          </a:gsLst>
+          <a:lin ang="5400000" scaled="0"/>
+        </a:gradFill>
+      </a:bgFillStyleLst>
+    </a:fmtScheme>
+  </a:themeElements>
+  <a:objectDefaults/>
+  <a:extraClrSchemeLst/>
+  <a:extLst>
+    <a:ext uri="{05A4C25C-085E-4340-85A3-A5531E510DB2}">
+      <thm15:themeFamily xmlns:thm15="http://schemas.microsoft.com/office/thememl/2012/main" name="Office Theme" id="{62F939B6-93AF-4DB8-9C6B-D6C7DFDC589F}" vid="{4A3C46E8-61CC-4603-A589-7422A47A8E4A}"/>
+    </a:ext>
+  </a:extLst>
+</a:theme>
 </file>
</xml_diff>